<commit_message>
Updated overview .pptx with new structure
</commit_message>
<xml_diff>
--- a/vignettes/RAP overview.pptx
+++ b/vignettes/RAP overview.pptx
@@ -8,15 +8,16 @@
     <p:sldId id="257" r:id="rId2"/>
     <p:sldId id="258" r:id="rId3"/>
     <p:sldId id="256" r:id="rId4"/>
-    <p:sldId id="259" r:id="rId5"/>
-    <p:sldId id="260" r:id="rId6"/>
-    <p:sldId id="261" r:id="rId7"/>
-    <p:sldId id="262" r:id="rId8"/>
-    <p:sldId id="263" r:id="rId9"/>
-    <p:sldId id="264" r:id="rId10"/>
-    <p:sldId id="265" r:id="rId11"/>
-    <p:sldId id="266" r:id="rId12"/>
-    <p:sldId id="267" r:id="rId13"/>
+    <p:sldId id="269" r:id="rId5"/>
+    <p:sldId id="259" r:id="rId6"/>
+    <p:sldId id="260" r:id="rId7"/>
+    <p:sldId id="261" r:id="rId8"/>
+    <p:sldId id="262" r:id="rId9"/>
+    <p:sldId id="263" r:id="rId10"/>
+    <p:sldId id="264" r:id="rId11"/>
+    <p:sldId id="265" r:id="rId12"/>
+    <p:sldId id="266" r:id="rId13"/>
+    <p:sldId id="267" r:id="rId14"/>
   </p:sldIdLst>
   <p:sldSz cx="12192000" cy="6858000"/>
   <p:notesSz cx="6858000" cy="9144000"/>
@@ -115,6 +116,11 @@
       </a:defRPr>
     </a:lvl9pPr>
   </p:defaultTextStyle>
+  <p:extLst>
+    <p:ext uri="{EFAFB233-063F-42B5-8137-9DF3F51BA10A}">
+      <p15:sldGuideLst xmlns:p15="http://schemas.microsoft.com/office/powerpoint/2012/main"/>
+    </p:ext>
+  </p:extLst>
 </p:presentation>
 </file>
 
@@ -249,7 +255,7 @@
           <a:p>
             <a:fld id="{9FABA390-D603-4FE1-BC20-34078821C5FB}" type="datetimeFigureOut">
               <a:rPr lang="en-GB" smtClean="0"/>
-              <a:t>19/03/2018</a:t>
+              <a:t>27/03/2018</a:t>
             </a:fld>
             <a:endParaRPr lang="en-GB"/>
           </a:p>
@@ -419,7 +425,7 @@
           <a:p>
             <a:fld id="{9FABA390-D603-4FE1-BC20-34078821C5FB}" type="datetimeFigureOut">
               <a:rPr lang="en-GB" smtClean="0"/>
-              <a:t>19/03/2018</a:t>
+              <a:t>27/03/2018</a:t>
             </a:fld>
             <a:endParaRPr lang="en-GB"/>
           </a:p>
@@ -599,7 +605,7 @@
           <a:p>
             <a:fld id="{9FABA390-D603-4FE1-BC20-34078821C5FB}" type="datetimeFigureOut">
               <a:rPr lang="en-GB" smtClean="0"/>
-              <a:t>19/03/2018</a:t>
+              <a:t>27/03/2018</a:t>
             </a:fld>
             <a:endParaRPr lang="en-GB"/>
           </a:p>
@@ -769,7 +775,7 @@
           <a:p>
             <a:fld id="{9FABA390-D603-4FE1-BC20-34078821C5FB}" type="datetimeFigureOut">
               <a:rPr lang="en-GB" smtClean="0"/>
-              <a:t>19/03/2018</a:t>
+              <a:t>27/03/2018</a:t>
             </a:fld>
             <a:endParaRPr lang="en-GB"/>
           </a:p>
@@ -1015,7 +1021,7 @@
           <a:p>
             <a:fld id="{9FABA390-D603-4FE1-BC20-34078821C5FB}" type="datetimeFigureOut">
               <a:rPr lang="en-GB" smtClean="0"/>
-              <a:t>19/03/2018</a:t>
+              <a:t>27/03/2018</a:t>
             </a:fld>
             <a:endParaRPr lang="en-GB"/>
           </a:p>
@@ -1247,7 +1253,7 @@
           <a:p>
             <a:fld id="{9FABA390-D603-4FE1-BC20-34078821C5FB}" type="datetimeFigureOut">
               <a:rPr lang="en-GB" smtClean="0"/>
-              <a:t>19/03/2018</a:t>
+              <a:t>27/03/2018</a:t>
             </a:fld>
             <a:endParaRPr lang="en-GB"/>
           </a:p>
@@ -1614,7 +1620,7 @@
           <a:p>
             <a:fld id="{9FABA390-D603-4FE1-BC20-34078821C5FB}" type="datetimeFigureOut">
               <a:rPr lang="en-GB" smtClean="0"/>
-              <a:t>19/03/2018</a:t>
+              <a:t>27/03/2018</a:t>
             </a:fld>
             <a:endParaRPr lang="en-GB"/>
           </a:p>
@@ -1732,7 +1738,7 @@
           <a:p>
             <a:fld id="{9FABA390-D603-4FE1-BC20-34078821C5FB}" type="datetimeFigureOut">
               <a:rPr lang="en-GB" smtClean="0"/>
-              <a:t>19/03/2018</a:t>
+              <a:t>27/03/2018</a:t>
             </a:fld>
             <a:endParaRPr lang="en-GB"/>
           </a:p>
@@ -1827,7 +1833,7 @@
           <a:p>
             <a:fld id="{9FABA390-D603-4FE1-BC20-34078821C5FB}" type="datetimeFigureOut">
               <a:rPr lang="en-GB" smtClean="0"/>
-              <a:t>19/03/2018</a:t>
+              <a:t>27/03/2018</a:t>
             </a:fld>
             <a:endParaRPr lang="en-GB"/>
           </a:p>
@@ -2104,7 +2110,7 @@
           <a:p>
             <a:fld id="{9FABA390-D603-4FE1-BC20-34078821C5FB}" type="datetimeFigureOut">
               <a:rPr lang="en-GB" smtClean="0"/>
-              <a:t>19/03/2018</a:t>
+              <a:t>27/03/2018</a:t>
             </a:fld>
             <a:endParaRPr lang="en-GB"/>
           </a:p>
@@ -2357,7 +2363,7 @@
           <a:p>
             <a:fld id="{9FABA390-D603-4FE1-BC20-34078821C5FB}" type="datetimeFigureOut">
               <a:rPr lang="en-GB" smtClean="0"/>
-              <a:t>19/03/2018</a:t>
+              <a:t>27/03/2018</a:t>
             </a:fld>
             <a:endParaRPr lang="en-GB"/>
           </a:p>
@@ -2570,7 +2576,7 @@
           <a:p>
             <a:fld id="{9FABA390-D603-4FE1-BC20-34078821C5FB}" type="datetimeFigureOut">
               <a:rPr lang="en-GB" smtClean="0"/>
-              <a:t>19/03/2018</a:t>
+              <a:t>27/03/2018</a:t>
             </a:fld>
             <a:endParaRPr lang="en-GB"/>
           </a:p>
@@ -3555,19 +3561,11 @@
                   <a:srgbClr val="00B050"/>
                 </a:solidFill>
               </a:rPr>
-              <a:t>cross</a:t>
+              <a:t>SSA</a:t>
             </a:r>
             <a:r>
               <a:rPr lang="en-GB" dirty="0" smtClean="0"/>
-              <a:t> (</a:t>
-            </a:r>
-            <a:r>
-              <a:rPr lang="en-GB" dirty="0" err="1" smtClean="0"/>
-              <a:t>qtl</a:t>
-            </a:r>
-            <a:r>
-              <a:rPr lang="en-GB" dirty="0" smtClean="0"/>
-              <a:t> package)</a:t>
+              <a:t> (Single Site Analysis)</a:t>
             </a:r>
             <a:endParaRPr lang="en-GB" dirty="0"/>
           </a:p>
@@ -3612,12 +3610,32 @@
               <a:t>Object of class </a:t>
             </a:r>
             <a:r>
-              <a:rPr lang="en-GB" dirty="0" err="1" smtClean="0">
+              <a:rPr lang="en-GB" dirty="0">
                 <a:solidFill>
                   <a:srgbClr val="00B050"/>
                 </a:solidFill>
               </a:rPr>
-              <a:t>QTLDet</a:t>
+              <a:t>c</a:t>
+            </a:r>
+            <a:r>
+              <a:rPr lang="en-GB" dirty="0" smtClean="0">
+                <a:solidFill>
+                  <a:srgbClr val="00B050"/>
+                </a:solidFill>
+              </a:rPr>
+              <a:t>ross</a:t>
+            </a:r>
+            <a:r>
+              <a:rPr lang="en-GB" dirty="0" smtClean="0"/>
+              <a:t> (</a:t>
+            </a:r>
+            <a:r>
+              <a:rPr lang="en-GB" dirty="0" err="1" smtClean="0"/>
+              <a:t>qtl</a:t>
+            </a:r>
+            <a:r>
+              <a:rPr lang="en-GB" dirty="0" smtClean="0"/>
+              <a:t> package)</a:t>
             </a:r>
             <a:endParaRPr lang="en-GB" dirty="0"/>
           </a:p>
@@ -3632,7 +3650,7 @@
         <p:spPr>
           <a:xfrm>
             <a:off x="2691132" y="2054322"/>
-            <a:ext cx="1787235" cy="3142829"/>
+            <a:ext cx="1787235" cy="2881572"/>
           </a:xfrm>
           <a:prstGeom prst="rect">
             <a:avLst/>
@@ -3663,7 +3681,7 @@
                   <a:srgbClr val="0070C0"/>
                 </a:solidFill>
               </a:rPr>
-              <a:t>QTLDetect</a:t>
+              <a:t>SSAtoCross</a:t>
             </a:r>
             <a:endParaRPr lang="en-GB" dirty="0" smtClean="0">
               <a:solidFill>
@@ -3678,37 +3696,7 @@
           <a:p>
             <a:r>
               <a:rPr lang="en-GB" sz="1400" dirty="0" smtClean="0"/>
-              <a:t>QTL Detection using </a:t>
-            </a:r>
-            <a:r>
-              <a:rPr lang="en-GB" sz="1400" dirty="0" err="1" smtClean="0"/>
-              <a:t>scanone</a:t>
-            </a:r>
-            <a:r>
-              <a:rPr lang="en-GB" sz="1400" dirty="0" smtClean="0"/>
-              <a:t> or </a:t>
-            </a:r>
-            <a:r>
-              <a:rPr lang="en-GB" sz="1400" dirty="0" err="1" smtClean="0"/>
-              <a:t>cim</a:t>
-            </a:r>
-            <a:r>
-              <a:rPr lang="en-GB" sz="1400" dirty="0" smtClean="0"/>
-              <a:t> from </a:t>
-            </a:r>
-            <a:r>
-              <a:rPr lang="en-GB" sz="1400" dirty="0" err="1" smtClean="0"/>
-              <a:t>qtl</a:t>
-            </a:r>
-            <a:r>
-              <a:rPr lang="en-GB" sz="1400" dirty="0" smtClean="0"/>
-              <a:t> package. </a:t>
-            </a:r>
-          </a:p>
-          <a:p>
-            <a:r>
-              <a:rPr lang="en-GB" sz="1400" dirty="0" smtClean="0"/>
-              <a:t>Then selection of peaks is done until all remaining peaks are significant.</a:t>
+              <a:t>Create cross object based on SSA object</a:t>
             </a:r>
           </a:p>
           <a:p>
@@ -3721,15 +3709,27 @@
             </a:pPr>
             <a:r>
               <a:rPr lang="en-GB" sz="1400" dirty="0" smtClean="0"/>
-              <a:t>Window </a:t>
-            </a:r>
-            <a:r>
-              <a:rPr lang="en-GB" sz="1400" dirty="0" err="1" smtClean="0"/>
-              <a:t>en</a:t>
-            </a:r>
-            <a:r>
-              <a:rPr lang="en-GB" sz="1400" dirty="0" smtClean="0"/>
-              <a:t> threshold for peaks can be modified</a:t>
+              <a:t>BLUEs or BLUPs as trait</a:t>
+            </a:r>
+          </a:p>
+          <a:p>
+            <a:pPr marL="285750" indent="-285750">
+              <a:buFont typeface="Arial" panose="020B0604020202020204" pitchFamily="34" charset="0"/>
+              <a:buChar char="•"/>
+            </a:pPr>
+            <a:r>
+              <a:rPr lang="en-GB" sz="1400" dirty="0" smtClean="0"/>
+              <a:t>1 or more traits</a:t>
+            </a:r>
+          </a:p>
+          <a:p>
+            <a:pPr marL="285750" indent="-285750">
+              <a:buFont typeface="Arial" panose="020B0604020202020204" pitchFamily="34" charset="0"/>
+              <a:buChar char="•"/>
+            </a:pPr>
+            <a:r>
+              <a:rPr lang="en-GB" sz="1400" dirty="0" smtClean="0"/>
+              <a:t>Genotypic data imported from external file</a:t>
             </a:r>
           </a:p>
         </p:txBody>
@@ -3742,7 +3742,7 @@
         </p:nvCxnSpPr>
         <p:spPr>
           <a:xfrm>
-            <a:off x="5589649" y="1587055"/>
+            <a:off x="5654963" y="1587055"/>
             <a:ext cx="0" cy="558989"/>
           </a:xfrm>
           <a:prstGeom prst="straightConnector1">
@@ -3878,6 +3878,771 @@
             <a:pPr algn="ctr"/>
             <a:r>
               <a:rPr lang="en-GB" sz="3200" dirty="0" smtClean="0"/>
+              <a:t>QTL Mapping (1)</a:t>
+            </a:r>
+            <a:endParaRPr lang="en-GB" sz="3200" dirty="0"/>
+          </a:p>
+        </p:txBody>
+      </p:sp>
+      <p:sp>
+        <p:nvSpPr>
+          <p:cNvPr id="41" name="Rectangle 40"/>
+          <p:cNvSpPr/>
+          <p:nvPr/>
+        </p:nvSpPr>
+        <p:spPr>
+          <a:xfrm>
+            <a:off x="7127254" y="897100"/>
+            <a:ext cx="1787235" cy="4113440"/>
+          </a:xfrm>
+          <a:prstGeom prst="rect">
+            <a:avLst/>
+          </a:prstGeom>
+        </p:spPr>
+        <p:style>
+          <a:lnRef idx="2">
+            <a:schemeClr val="dk1"/>
+          </a:lnRef>
+          <a:fillRef idx="1">
+            <a:schemeClr val="lt1"/>
+          </a:fillRef>
+          <a:effectRef idx="0">
+            <a:schemeClr val="dk1"/>
+          </a:effectRef>
+          <a:fontRef idx="minor">
+            <a:schemeClr val="dk1"/>
+          </a:fontRef>
+        </p:style>
+        <p:txBody>
+          <a:bodyPr rtlCol="0" anchor="ctr"/>
+          <a:lstStyle/>
+          <a:p>
+            <a:pPr algn="ctr"/>
+            <a:r>
+              <a:rPr lang="en-GB" dirty="0" err="1" smtClean="0">
+                <a:solidFill>
+                  <a:srgbClr val="0070C0"/>
+                </a:solidFill>
+              </a:rPr>
+              <a:t>QTLMapQC</a:t>
+            </a:r>
+            <a:endParaRPr lang="en-GB" dirty="0" smtClean="0">
+              <a:solidFill>
+                <a:srgbClr val="0070C0"/>
+              </a:solidFill>
+            </a:endParaRPr>
+          </a:p>
+          <a:p>
+            <a:pPr algn="ctr"/>
+            <a:endParaRPr lang="en-GB" dirty="0" smtClean="0"/>
+          </a:p>
+          <a:p>
+            <a:r>
+              <a:rPr lang="en-GB" sz="1400" dirty="0" smtClean="0"/>
+              <a:t>Quality control of an object of class cross</a:t>
+            </a:r>
+          </a:p>
+          <a:p>
+            <a:endParaRPr lang="en-GB" sz="1400" dirty="0" smtClean="0"/>
+          </a:p>
+          <a:p>
+            <a:r>
+              <a:rPr lang="en-GB" sz="1400" dirty="0" smtClean="0"/>
+              <a:t>Checks/cleaning for</a:t>
+            </a:r>
+          </a:p>
+          <a:p>
+            <a:pPr marL="285750" indent="-285750">
+              <a:buFont typeface="Arial" panose="020B0604020202020204" pitchFamily="34" charset="0"/>
+              <a:buChar char="•"/>
+            </a:pPr>
+            <a:r>
+              <a:rPr lang="en-GB" sz="1400" dirty="0" smtClean="0"/>
+              <a:t>% miss markers</a:t>
+            </a:r>
+          </a:p>
+          <a:p>
+            <a:pPr marL="285750" indent="-285750">
+              <a:buFont typeface="Arial" panose="020B0604020202020204" pitchFamily="34" charset="0"/>
+              <a:buChar char="•"/>
+            </a:pPr>
+            <a:r>
+              <a:rPr lang="en-GB" sz="1400" dirty="0" smtClean="0"/>
+              <a:t>duplicates</a:t>
+            </a:r>
+          </a:p>
+          <a:p>
+            <a:pPr marL="285750" indent="-285750">
+              <a:buFont typeface="Arial" panose="020B0604020202020204" pitchFamily="34" charset="0"/>
+              <a:buChar char="•"/>
+            </a:pPr>
+            <a:r>
+              <a:rPr lang="en-GB" sz="1400" dirty="0" smtClean="0"/>
+              <a:t>%miss individuals</a:t>
+            </a:r>
+          </a:p>
+          <a:p>
+            <a:pPr marL="285750" indent="-285750">
+              <a:buFont typeface="Arial" panose="020B0604020202020204" pitchFamily="34" charset="0"/>
+              <a:buChar char="•"/>
+            </a:pPr>
+            <a:r>
+              <a:rPr lang="en-GB" sz="1400" dirty="0" smtClean="0"/>
+              <a:t>Segregation distortion</a:t>
+            </a:r>
+          </a:p>
+          <a:p>
+            <a:pPr marL="285750" indent="-285750">
+              <a:buFont typeface="Arial" panose="020B0604020202020204" pitchFamily="34" charset="0"/>
+              <a:buChar char="•"/>
+            </a:pPr>
+            <a:r>
+              <a:rPr lang="en-GB" sz="1400" dirty="0" smtClean="0"/>
+              <a:t>Recombination</a:t>
+            </a:r>
+          </a:p>
+          <a:p>
+            <a:pPr marL="285750" indent="-285750">
+              <a:buFont typeface="Arial" panose="020B0604020202020204" pitchFamily="34" charset="0"/>
+              <a:buChar char="•"/>
+            </a:pPr>
+            <a:r>
+              <a:rPr lang="en-GB" sz="1400" dirty="0" err="1" smtClean="0"/>
+              <a:t>Reestimate</a:t>
+            </a:r>
+            <a:r>
+              <a:rPr lang="en-GB" sz="1400" dirty="0" smtClean="0"/>
+              <a:t> map</a:t>
+            </a:r>
+          </a:p>
+          <a:p>
+            <a:pPr marL="285750" indent="-285750">
+              <a:buFont typeface="Arial" panose="020B0604020202020204" pitchFamily="34" charset="0"/>
+              <a:buChar char="•"/>
+            </a:pPr>
+            <a:r>
+              <a:rPr lang="en-GB" sz="1400" dirty="0" smtClean="0"/>
+              <a:t>% crossover</a:t>
+            </a:r>
+          </a:p>
+          <a:p>
+            <a:pPr marL="285750" indent="-285750">
+              <a:buFont typeface="Arial" panose="020B0604020202020204" pitchFamily="34" charset="0"/>
+              <a:buChar char="•"/>
+            </a:pPr>
+            <a:endParaRPr lang="en-GB" sz="1400" dirty="0"/>
+          </a:p>
+          <a:p>
+            <a:r>
+              <a:rPr lang="en-GB" sz="1400" dirty="0" smtClean="0"/>
+              <a:t>All checks are optional</a:t>
+            </a:r>
+          </a:p>
+        </p:txBody>
+      </p:sp>
+      <p:cxnSp>
+        <p:nvCxnSpPr>
+          <p:cNvPr id="43" name="Straight Arrow Connector 42"/>
+          <p:cNvCxnSpPr/>
+          <p:nvPr/>
+        </p:nvCxnSpPr>
+        <p:spPr>
+          <a:xfrm>
+            <a:off x="6624743" y="1199495"/>
+            <a:ext cx="420477" cy="1"/>
+          </a:xfrm>
+          <a:prstGeom prst="straightConnector1">
+            <a:avLst/>
+          </a:prstGeom>
+          <a:ln>
+            <a:solidFill>
+              <a:schemeClr val="tx1"/>
+            </a:solidFill>
+            <a:tailEnd type="triangle"/>
+          </a:ln>
+        </p:spPr>
+        <p:style>
+          <a:lnRef idx="1">
+            <a:schemeClr val="accent1"/>
+          </a:lnRef>
+          <a:fillRef idx="0">
+            <a:schemeClr val="accent1"/>
+          </a:fillRef>
+          <a:effectRef idx="0">
+            <a:schemeClr val="accent1"/>
+          </a:effectRef>
+          <a:fontRef idx="minor">
+            <a:schemeClr val="tx1"/>
+          </a:fontRef>
+        </p:style>
+      </p:cxnSp>
+      <p:sp>
+        <p:nvSpPr>
+          <p:cNvPr id="23" name="Rectangle 22"/>
+          <p:cNvSpPr/>
+          <p:nvPr/>
+        </p:nvSpPr>
+        <p:spPr>
+          <a:xfrm>
+            <a:off x="4969163" y="2271809"/>
+            <a:ext cx="1371600" cy="1009006"/>
+          </a:xfrm>
+          <a:prstGeom prst="rect">
+            <a:avLst/>
+          </a:prstGeom>
+        </p:spPr>
+        <p:style>
+          <a:lnRef idx="2">
+            <a:schemeClr val="dk1"/>
+          </a:lnRef>
+          <a:fillRef idx="1">
+            <a:schemeClr val="lt1"/>
+          </a:fillRef>
+          <a:effectRef idx="0">
+            <a:schemeClr val="dk1"/>
+          </a:effectRef>
+          <a:fontRef idx="minor">
+            <a:schemeClr val="dk1"/>
+          </a:fontRef>
+        </p:style>
+        <p:txBody>
+          <a:bodyPr rtlCol="0" anchor="ctr"/>
+          <a:lstStyle/>
+          <a:p>
+            <a:pPr algn="ctr"/>
+            <a:r>
+              <a:rPr lang="en-GB" dirty="0" smtClean="0">
+                <a:solidFill>
+                  <a:srgbClr val="0070C0"/>
+                </a:solidFill>
+              </a:rPr>
+              <a:t>Report</a:t>
+            </a:r>
+          </a:p>
+          <a:p>
+            <a:pPr algn="ctr"/>
+            <a:endParaRPr lang="en-GB" dirty="0" smtClean="0"/>
+          </a:p>
+          <a:p>
+            <a:pPr marL="285750" indent="-285750">
+              <a:buFont typeface="Arial" panose="020B0604020202020204" pitchFamily="34" charset="0"/>
+              <a:buChar char="•"/>
+            </a:pPr>
+            <a:r>
+              <a:rPr lang="en-GB" sz="1400" dirty="0" smtClean="0"/>
+              <a:t>.pdf + .</a:t>
+            </a:r>
+            <a:r>
+              <a:rPr lang="en-GB" sz="1400" dirty="0" err="1" smtClean="0"/>
+              <a:t>tex</a:t>
+            </a:r>
+            <a:endParaRPr lang="en-GB" sz="1400" dirty="0"/>
+          </a:p>
+        </p:txBody>
+      </p:sp>
+      <p:sp>
+        <p:nvSpPr>
+          <p:cNvPr id="26" name="Rectangle 25"/>
+          <p:cNvSpPr/>
+          <p:nvPr/>
+        </p:nvSpPr>
+        <p:spPr>
+          <a:xfrm>
+            <a:off x="9581561" y="887768"/>
+            <a:ext cx="1981815" cy="623454"/>
+          </a:xfrm>
+          <a:prstGeom prst="rect">
+            <a:avLst/>
+          </a:prstGeom>
+        </p:spPr>
+        <p:style>
+          <a:lnRef idx="2">
+            <a:schemeClr val="dk1"/>
+          </a:lnRef>
+          <a:fillRef idx="1">
+            <a:schemeClr val="lt1"/>
+          </a:fillRef>
+          <a:effectRef idx="0">
+            <a:schemeClr val="dk1"/>
+          </a:effectRef>
+          <a:fontRef idx="minor">
+            <a:schemeClr val="dk1"/>
+          </a:fontRef>
+        </p:style>
+        <p:txBody>
+          <a:bodyPr rtlCol="0" anchor="ctr"/>
+          <a:lstStyle/>
+          <a:p>
+            <a:pPr algn="ctr"/>
+            <a:r>
+              <a:rPr lang="en-GB" dirty="0" smtClean="0"/>
+              <a:t>Object of class </a:t>
+            </a:r>
+            <a:r>
+              <a:rPr lang="en-GB" dirty="0">
+                <a:solidFill>
+                  <a:srgbClr val="00B050"/>
+                </a:solidFill>
+              </a:rPr>
+              <a:t>c</a:t>
+            </a:r>
+            <a:r>
+              <a:rPr lang="en-GB" dirty="0" smtClean="0">
+                <a:solidFill>
+                  <a:srgbClr val="00B050"/>
+                </a:solidFill>
+              </a:rPr>
+              <a:t>ross</a:t>
+            </a:r>
+            <a:r>
+              <a:rPr lang="en-GB" dirty="0" smtClean="0"/>
+              <a:t> (</a:t>
+            </a:r>
+            <a:r>
+              <a:rPr lang="en-GB" dirty="0" err="1" smtClean="0"/>
+              <a:t>qtl</a:t>
+            </a:r>
+            <a:r>
+              <a:rPr lang="en-GB" dirty="0" smtClean="0"/>
+              <a:t> package)</a:t>
+            </a:r>
+            <a:endParaRPr lang="en-GB" dirty="0"/>
+          </a:p>
+        </p:txBody>
+      </p:sp>
+      <p:cxnSp>
+        <p:nvCxnSpPr>
+          <p:cNvPr id="27" name="Straight Arrow Connector 26"/>
+          <p:cNvCxnSpPr/>
+          <p:nvPr/>
+        </p:nvCxnSpPr>
+        <p:spPr>
+          <a:xfrm>
+            <a:off x="8996523" y="1199494"/>
+            <a:ext cx="485795" cy="1"/>
+          </a:xfrm>
+          <a:prstGeom prst="straightConnector1">
+            <a:avLst/>
+          </a:prstGeom>
+          <a:ln>
+            <a:solidFill>
+              <a:schemeClr val="tx1"/>
+            </a:solidFill>
+            <a:tailEnd type="triangle"/>
+          </a:ln>
+        </p:spPr>
+        <p:style>
+          <a:lnRef idx="1">
+            <a:schemeClr val="accent1"/>
+          </a:lnRef>
+          <a:fillRef idx="0">
+            <a:schemeClr val="accent1"/>
+          </a:fillRef>
+          <a:effectRef idx="0">
+            <a:schemeClr val="accent1"/>
+          </a:effectRef>
+          <a:fontRef idx="minor">
+            <a:schemeClr val="tx1"/>
+          </a:fontRef>
+        </p:style>
+      </p:cxnSp>
+    </p:spTree>
+    <p:extLst>
+      <p:ext uri="{BB962C8B-B14F-4D97-AF65-F5344CB8AC3E}">
+        <p14:creationId xmlns:p14="http://schemas.microsoft.com/office/powerpoint/2010/main" val="3963092974"/>
+      </p:ext>
+    </p:extLst>
+  </p:cSld>
+  <p:clrMapOvr>
+    <a:masterClrMapping/>
+  </p:clrMapOvr>
+</p:sld>
+</file>
+
+<file path=ppt/slides/slide11.xml><?xml version="1.0" encoding="utf-8"?>
+<p:sld xmlns:a="http://schemas.openxmlformats.org/drawingml/2006/main" xmlns:r="http://schemas.openxmlformats.org/officeDocument/2006/relationships" xmlns:p="http://schemas.openxmlformats.org/presentationml/2006/main">
+  <p:cSld>
+    <p:spTree>
+      <p:nvGrpSpPr>
+        <p:cNvPr id="1" name=""/>
+        <p:cNvGrpSpPr/>
+        <p:nvPr/>
+      </p:nvGrpSpPr>
+      <p:grpSpPr>
+        <a:xfrm>
+          <a:off x="0" y="0"/>
+          <a:ext cx="0" cy="0"/>
+          <a:chOff x="0" y="0"/>
+          <a:chExt cx="0" cy="0"/>
+        </a:xfrm>
+      </p:grpSpPr>
+      <p:sp>
+        <p:nvSpPr>
+          <p:cNvPr id="4" name="Rectangle 3"/>
+          <p:cNvSpPr/>
+          <p:nvPr/>
+        </p:nvSpPr>
+        <p:spPr>
+          <a:xfrm>
+            <a:off x="505215" y="897099"/>
+            <a:ext cx="2154018" cy="623454"/>
+          </a:xfrm>
+          <a:prstGeom prst="rect">
+            <a:avLst/>
+          </a:prstGeom>
+        </p:spPr>
+        <p:style>
+          <a:lnRef idx="2">
+            <a:schemeClr val="dk1"/>
+          </a:lnRef>
+          <a:fillRef idx="1">
+            <a:schemeClr val="lt1"/>
+          </a:fillRef>
+          <a:effectRef idx="0">
+            <a:schemeClr val="dk1"/>
+          </a:effectRef>
+          <a:fontRef idx="minor">
+            <a:schemeClr val="dk1"/>
+          </a:fontRef>
+        </p:style>
+        <p:txBody>
+          <a:bodyPr rtlCol="0" anchor="ctr"/>
+          <a:lstStyle/>
+          <a:p>
+            <a:pPr algn="ctr"/>
+            <a:r>
+              <a:rPr lang="en-GB" dirty="0" smtClean="0"/>
+              <a:t>Object of class </a:t>
+            </a:r>
+            <a:r>
+              <a:rPr lang="en-GB" dirty="0" smtClean="0">
+                <a:solidFill>
+                  <a:srgbClr val="00B050"/>
+                </a:solidFill>
+              </a:rPr>
+              <a:t>cross</a:t>
+            </a:r>
+            <a:r>
+              <a:rPr lang="en-GB" dirty="0" smtClean="0"/>
+              <a:t> (</a:t>
+            </a:r>
+            <a:r>
+              <a:rPr lang="en-GB" dirty="0" err="1" smtClean="0"/>
+              <a:t>qtl</a:t>
+            </a:r>
+            <a:r>
+              <a:rPr lang="en-GB" dirty="0" smtClean="0"/>
+              <a:t> package)</a:t>
+            </a:r>
+            <a:endParaRPr lang="en-GB" dirty="0"/>
+          </a:p>
+        </p:txBody>
+      </p:sp>
+      <p:sp>
+        <p:nvSpPr>
+          <p:cNvPr id="7" name="Rectangle 6"/>
+          <p:cNvSpPr/>
+          <p:nvPr/>
+        </p:nvSpPr>
+        <p:spPr>
+          <a:xfrm>
+            <a:off x="4577610" y="897099"/>
+            <a:ext cx="1981815" cy="623454"/>
+          </a:xfrm>
+          <a:prstGeom prst="rect">
+            <a:avLst/>
+          </a:prstGeom>
+        </p:spPr>
+        <p:style>
+          <a:lnRef idx="2">
+            <a:schemeClr val="dk1"/>
+          </a:lnRef>
+          <a:fillRef idx="1">
+            <a:schemeClr val="lt1"/>
+          </a:fillRef>
+          <a:effectRef idx="0">
+            <a:schemeClr val="dk1"/>
+          </a:effectRef>
+          <a:fontRef idx="minor">
+            <a:schemeClr val="dk1"/>
+          </a:fontRef>
+        </p:style>
+        <p:txBody>
+          <a:bodyPr rtlCol="0" anchor="ctr"/>
+          <a:lstStyle/>
+          <a:p>
+            <a:pPr algn="ctr"/>
+            <a:r>
+              <a:rPr lang="en-GB" dirty="0" smtClean="0"/>
+              <a:t>Object of class </a:t>
+            </a:r>
+            <a:r>
+              <a:rPr lang="en-GB" dirty="0" err="1" smtClean="0">
+                <a:solidFill>
+                  <a:srgbClr val="00B050"/>
+                </a:solidFill>
+              </a:rPr>
+              <a:t>QTLDet</a:t>
+            </a:r>
+            <a:endParaRPr lang="en-GB" dirty="0"/>
+          </a:p>
+        </p:txBody>
+      </p:sp>
+      <p:sp>
+        <p:nvSpPr>
+          <p:cNvPr id="11" name="Rectangle 10"/>
+          <p:cNvSpPr/>
+          <p:nvPr/>
+        </p:nvSpPr>
+        <p:spPr>
+          <a:xfrm>
+            <a:off x="2691132" y="2054322"/>
+            <a:ext cx="1787235" cy="3142829"/>
+          </a:xfrm>
+          <a:prstGeom prst="rect">
+            <a:avLst/>
+          </a:prstGeom>
+        </p:spPr>
+        <p:style>
+          <a:lnRef idx="2">
+            <a:schemeClr val="dk1"/>
+          </a:lnRef>
+          <a:fillRef idx="1">
+            <a:schemeClr val="lt1"/>
+          </a:fillRef>
+          <a:effectRef idx="0">
+            <a:schemeClr val="dk1"/>
+          </a:effectRef>
+          <a:fontRef idx="minor">
+            <a:schemeClr val="dk1"/>
+          </a:fontRef>
+        </p:style>
+        <p:txBody>
+          <a:bodyPr rtlCol="0" anchor="ctr"/>
+          <a:lstStyle/>
+          <a:p>
+            <a:pPr algn="ctr"/>
+            <a:r>
+              <a:rPr lang="en-GB" dirty="0" err="1" smtClean="0">
+                <a:solidFill>
+                  <a:srgbClr val="0070C0"/>
+                </a:solidFill>
+              </a:rPr>
+              <a:t>QTLDetect</a:t>
+            </a:r>
+            <a:endParaRPr lang="en-GB" dirty="0" smtClean="0">
+              <a:solidFill>
+                <a:srgbClr val="0070C0"/>
+              </a:solidFill>
+            </a:endParaRPr>
+          </a:p>
+          <a:p>
+            <a:pPr algn="ctr"/>
+            <a:endParaRPr lang="en-GB" dirty="0" smtClean="0"/>
+          </a:p>
+          <a:p>
+            <a:r>
+              <a:rPr lang="en-GB" sz="1400" dirty="0" smtClean="0"/>
+              <a:t>QTL Detection using </a:t>
+            </a:r>
+            <a:r>
+              <a:rPr lang="en-GB" sz="1400" dirty="0" err="1" smtClean="0"/>
+              <a:t>scanone</a:t>
+            </a:r>
+            <a:r>
+              <a:rPr lang="en-GB" sz="1400" dirty="0" smtClean="0"/>
+              <a:t> or </a:t>
+            </a:r>
+            <a:r>
+              <a:rPr lang="en-GB" sz="1400" dirty="0" err="1" smtClean="0"/>
+              <a:t>cim</a:t>
+            </a:r>
+            <a:r>
+              <a:rPr lang="en-GB" sz="1400" dirty="0" smtClean="0"/>
+              <a:t> from </a:t>
+            </a:r>
+            <a:r>
+              <a:rPr lang="en-GB" sz="1400" dirty="0" err="1" smtClean="0"/>
+              <a:t>qtl</a:t>
+            </a:r>
+            <a:r>
+              <a:rPr lang="en-GB" sz="1400" dirty="0" smtClean="0"/>
+              <a:t> package. </a:t>
+            </a:r>
+          </a:p>
+          <a:p>
+            <a:r>
+              <a:rPr lang="en-GB" sz="1400" dirty="0" smtClean="0"/>
+              <a:t>Then selection of peaks is done until all remaining peaks are significant.</a:t>
+            </a:r>
+          </a:p>
+          <a:p>
+            <a:endParaRPr lang="en-GB" sz="1400" dirty="0"/>
+          </a:p>
+          <a:p>
+            <a:pPr marL="285750" indent="-285750">
+              <a:buFont typeface="Arial" panose="020B0604020202020204" pitchFamily="34" charset="0"/>
+              <a:buChar char="•"/>
+            </a:pPr>
+            <a:r>
+              <a:rPr lang="en-GB" sz="1400" dirty="0" smtClean="0"/>
+              <a:t>Window </a:t>
+            </a:r>
+            <a:r>
+              <a:rPr lang="en-GB" sz="1400" dirty="0" smtClean="0"/>
+              <a:t>and </a:t>
+            </a:r>
+            <a:r>
+              <a:rPr lang="en-GB" sz="1400" dirty="0" smtClean="0"/>
+              <a:t>threshold for peaks can be modified</a:t>
+            </a:r>
+          </a:p>
+        </p:txBody>
+      </p:sp>
+      <p:cxnSp>
+        <p:nvCxnSpPr>
+          <p:cNvPr id="19" name="Straight Arrow Connector 18"/>
+          <p:cNvCxnSpPr/>
+          <p:nvPr/>
+        </p:nvCxnSpPr>
+        <p:spPr>
+          <a:xfrm>
+            <a:off x="5589649" y="1587055"/>
+            <a:ext cx="0" cy="558989"/>
+          </a:xfrm>
+          <a:prstGeom prst="straightConnector1">
+            <a:avLst/>
+          </a:prstGeom>
+          <a:ln>
+            <a:solidFill>
+              <a:schemeClr val="tx1"/>
+            </a:solidFill>
+            <a:tailEnd type="triangle"/>
+          </a:ln>
+        </p:spPr>
+        <p:style>
+          <a:lnRef idx="1">
+            <a:schemeClr val="accent1"/>
+          </a:lnRef>
+          <a:fillRef idx="0">
+            <a:schemeClr val="accent1"/>
+          </a:fillRef>
+          <a:effectRef idx="0">
+            <a:schemeClr val="accent1"/>
+          </a:effectRef>
+          <a:fontRef idx="minor">
+            <a:schemeClr val="tx1"/>
+          </a:fontRef>
+        </p:style>
+      </p:cxnSp>
+      <p:grpSp>
+        <p:nvGrpSpPr>
+          <p:cNvPr id="31" name="Group 30"/>
+          <p:cNvGrpSpPr/>
+          <p:nvPr/>
+        </p:nvGrpSpPr>
+        <p:grpSpPr>
+          <a:xfrm>
+            <a:off x="2756449" y="1199495"/>
+            <a:ext cx="1787235" cy="759568"/>
+            <a:chOff x="1608775" y="1367443"/>
+            <a:chExt cx="1787235" cy="759568"/>
+          </a:xfrm>
+        </p:grpSpPr>
+        <p:cxnSp>
+          <p:nvCxnSpPr>
+            <p:cNvPr id="6" name="Straight Arrow Connector 5"/>
+            <p:cNvCxnSpPr/>
+            <p:nvPr/>
+          </p:nvCxnSpPr>
+          <p:spPr>
+            <a:xfrm>
+              <a:off x="1608775" y="1367443"/>
+              <a:ext cx="1787235" cy="0"/>
+            </a:xfrm>
+            <a:prstGeom prst="straightConnector1">
+              <a:avLst/>
+            </a:prstGeom>
+            <a:ln>
+              <a:tailEnd type="triangle"/>
+            </a:ln>
+          </p:spPr>
+          <p:style>
+            <a:lnRef idx="1">
+              <a:schemeClr val="dk1"/>
+            </a:lnRef>
+            <a:fillRef idx="0">
+              <a:schemeClr val="dk1"/>
+            </a:fillRef>
+            <a:effectRef idx="0">
+              <a:schemeClr val="dk1"/>
+            </a:effectRef>
+            <a:fontRef idx="minor">
+              <a:schemeClr val="tx1"/>
+            </a:fontRef>
+          </p:style>
+        </p:cxnSp>
+        <p:cxnSp>
+          <p:nvCxnSpPr>
+            <p:cNvPr id="30" name="Straight Connector 29"/>
+            <p:cNvCxnSpPr/>
+            <p:nvPr/>
+          </p:nvCxnSpPr>
+          <p:spPr>
+            <a:xfrm>
+              <a:off x="2463282" y="1367443"/>
+              <a:ext cx="9330" cy="759568"/>
+            </a:xfrm>
+            <a:prstGeom prst="line">
+              <a:avLst/>
+            </a:prstGeom>
+            <a:ln>
+              <a:solidFill>
+                <a:schemeClr val="tx1"/>
+              </a:solidFill>
+            </a:ln>
+          </p:spPr>
+          <p:style>
+            <a:lnRef idx="1">
+              <a:schemeClr val="accent1"/>
+            </a:lnRef>
+            <a:fillRef idx="0">
+              <a:schemeClr val="accent1"/>
+            </a:fillRef>
+            <a:effectRef idx="0">
+              <a:schemeClr val="accent1"/>
+            </a:effectRef>
+            <a:fontRef idx="minor">
+              <a:schemeClr val="tx1"/>
+            </a:fontRef>
+          </p:style>
+        </p:cxnSp>
+      </p:grpSp>
+      <p:sp>
+        <p:nvSpPr>
+          <p:cNvPr id="40" name="TextBox 39"/>
+          <p:cNvSpPr txBox="1"/>
+          <p:nvPr/>
+        </p:nvSpPr>
+        <p:spPr>
+          <a:xfrm>
+            <a:off x="1190584" y="119813"/>
+            <a:ext cx="9007775" cy="584775"/>
+          </a:xfrm>
+          <a:prstGeom prst="rect">
+            <a:avLst/>
+          </a:prstGeom>
+          <a:noFill/>
+        </p:spPr>
+        <p:txBody>
+          <a:bodyPr wrap="square" rtlCol="0">
+            <a:spAutoFit/>
+          </a:bodyPr>
+          <a:lstStyle/>
+          <a:p>
+            <a:pPr algn="ctr"/>
+            <a:r>
+              <a:rPr lang="en-GB" sz="3200" dirty="0" smtClean="0"/>
               <a:t>QTL Mapping (2)</a:t>
             </a:r>
             <a:endParaRPr lang="en-GB" sz="3200" dirty="0"/>
@@ -4440,7 +5205,7 @@
 </p:sld>
 </file>
 
-<file path=ppt/slides/slide11.xml><?xml version="1.0" encoding="utf-8"?>
+<file path=ppt/slides/slide12.xml><?xml version="1.0" encoding="utf-8"?>
 <p:sld xmlns:a="http://schemas.openxmlformats.org/drawingml/2006/main" xmlns:r="http://schemas.openxmlformats.org/officeDocument/2006/relationships" xmlns:p="http://schemas.openxmlformats.org/presentationml/2006/main">
   <p:cSld>
     <p:spTree>
@@ -4470,7 +5235,7 @@
         <p:spPr>
           <a:xfrm>
             <a:off x="931506" y="939216"/>
-            <a:ext cx="10515600" cy="786947"/>
+            <a:ext cx="10769082" cy="786947"/>
           </a:xfrm>
         </p:spPr>
         <p:txBody>
@@ -4478,20 +5243,6 @@
             <a:normAutofit/>
           </a:bodyPr>
           <a:lstStyle/>
-          <a:p>
-            <a:r>
-              <a:rPr lang="en-GB" sz="1400" dirty="0" err="1" smtClean="0">
-                <a:solidFill>
-                  <a:srgbClr val="0070C0"/>
-                </a:solidFill>
-              </a:rPr>
-              <a:t>outlierTD</a:t>
-            </a:r>
-            <a:r>
-              <a:rPr lang="en-GB" sz="1400" dirty="0" smtClean="0"/>
-              <a:t> – outlier detection for objects of class TD</a:t>
-            </a:r>
-          </a:p>
           <a:p>
             <a:r>
               <a:rPr lang="en-GB" sz="1400" dirty="0" err="1" smtClean="0">
@@ -4503,7 +5254,53 @@
             </a:r>
             <a:r>
               <a:rPr lang="en-GB" sz="1400" dirty="0" smtClean="0"/>
-              <a:t> – outlier detection for residuals in objects of class SSA</a:t>
+              <a:t> </a:t>
+            </a:r>
+            <a:r>
+              <a:rPr lang="en-GB" sz="1400" dirty="0" smtClean="0"/>
+              <a:t>– outlier detection for </a:t>
+            </a:r>
+            <a:r>
+              <a:rPr lang="en-GB" sz="1400" dirty="0" smtClean="0"/>
+              <a:t>residuals </a:t>
+            </a:r>
+            <a:r>
+              <a:rPr lang="en-GB" sz="1400" dirty="0" smtClean="0"/>
+              <a:t>in objects of class </a:t>
+            </a:r>
+            <a:r>
+              <a:rPr lang="en-GB" sz="1400" dirty="0" smtClean="0"/>
+              <a:t>SSA</a:t>
+            </a:r>
+          </a:p>
+          <a:p>
+            <a:r>
+              <a:rPr lang="en-GB" sz="1400" dirty="0" err="1" smtClean="0">
+                <a:solidFill>
+                  <a:srgbClr val="0070C0"/>
+                </a:solidFill>
+              </a:rPr>
+              <a:t>multMissing</a:t>
+            </a:r>
+            <a:r>
+              <a:rPr lang="en-GB" sz="1400" dirty="0" smtClean="0"/>
+              <a:t> – function for imputation of missing values using iterative regression. Mainly used in </a:t>
+            </a:r>
+            <a:r>
+              <a:rPr lang="en-GB" sz="1400" dirty="0" err="1" smtClean="0"/>
+              <a:t>gxe</a:t>
+            </a:r>
+            <a:r>
+              <a:rPr lang="en-GB" sz="1400" dirty="0" smtClean="0"/>
+              <a:t> functions when no </a:t>
+            </a:r>
+            <a:r>
+              <a:rPr lang="en-GB" sz="1400" dirty="0" err="1" smtClean="0"/>
+              <a:t>missings</a:t>
+            </a:r>
+            <a:r>
+              <a:rPr lang="en-GB" sz="1400" dirty="0" smtClean="0"/>
+              <a:t> are allowed</a:t>
             </a:r>
             <a:endParaRPr lang="en-GB" sz="1400" dirty="0"/>
           </a:p>
@@ -5055,7 +5852,7 @@
 </p:sld>
 </file>
 
-<file path=ppt/slides/slide12.xml><?xml version="1.0" encoding="utf-8"?>
+<file path=ppt/slides/slide13.xml><?xml version="1.0" encoding="utf-8"?>
 <p:sld xmlns:a="http://schemas.openxmlformats.org/drawingml/2006/main" xmlns:r="http://schemas.openxmlformats.org/officeDocument/2006/relationships" xmlns:p="http://schemas.openxmlformats.org/presentationml/2006/main">
   <p:cSld>
     <p:spTree>
@@ -5105,8 +5902,17 @@
           <a:p>
             <a:r>
               <a:rPr lang="en-GB" sz="1400" dirty="0" smtClean="0"/>
-              <a:t>Naming the package. RAP is taken on CRAN.</a:t>
-            </a:r>
+              <a:t>Naming the package. RAP is taken on CRAN</a:t>
+            </a:r>
+            <a:r>
+              <a:rPr lang="en-GB" sz="1400" dirty="0" smtClean="0"/>
+              <a:t>. – suggestions: BMSP, </a:t>
+            </a:r>
+            <a:r>
+              <a:rPr lang="en-GB" sz="1400" dirty="0" err="1" smtClean="0"/>
+              <a:t>BioMS</a:t>
+            </a:r>
+            <a:endParaRPr lang="en-GB" sz="1400" dirty="0" smtClean="0"/>
           </a:p>
           <a:p>
             <a:r>
@@ -5137,14 +5943,19 @@
             </a:r>
             <a:r>
               <a:rPr lang="en-GB" sz="1400" dirty="0" smtClean="0"/>
-              <a:t>. Should we get more unity here?</a:t>
-            </a:r>
-          </a:p>
-          <a:p>
-            <a:r>
-              <a:rPr lang="en-GB" sz="1400" dirty="0" smtClean="0"/>
-              <a:t>In the SES project weights are used when doing single site analysis. Do we want to include this in the package or should this be something SES specific?</a:t>
-            </a:r>
+              <a:t>. Should we get more unity here</a:t>
+            </a:r>
+            <a:r>
+              <a:rPr lang="en-GB" sz="1400" dirty="0" smtClean="0"/>
+              <a:t>?</a:t>
+            </a:r>
+          </a:p>
+          <a:p>
+            <a:r>
+              <a:rPr lang="en-GB" sz="1400" dirty="0" smtClean="0"/>
+              <a:t>Is the metadata complete as it is now or should more items be added – suggestions: altitude</a:t>
+            </a:r>
+            <a:endParaRPr lang="en-GB" sz="1400" dirty="0" smtClean="0"/>
           </a:p>
           <a:p>
             <a:endParaRPr lang="en-GB" sz="1400" dirty="0"/>
@@ -5172,12 +5983,12 @@
               <a:t> </a:t>
             </a:r>
             <a:r>
-              <a:rPr lang="en-GB" sz="1400" dirty="0" err="1" smtClean="0"/>
-              <a:t>modeling</a:t>
-            </a:r>
-            <a:r>
-              <a:rPr lang="en-GB" sz="1400" dirty="0" smtClean="0"/>
-              <a:t> is done now, only fitting a model with genotype fixed gives different results from fitting models for genotype fixed and random in the same function call. This has to do with starting values from the random model being used in the fixed model. Is this the desired behaviour?</a:t>
+              <a:rPr lang="en-GB" sz="1400" dirty="0" smtClean="0"/>
+              <a:t>modelling </a:t>
+            </a:r>
+            <a:r>
+              <a:rPr lang="en-GB" sz="1400" dirty="0" smtClean="0"/>
+              <a:t>is done now, only fitting a model with genotype fixed gives different results from fitting models for genotype fixed and random in the same function call. This has to do with starting values from the random model being used in the fixed model. Is this the desired behaviour?</a:t>
             </a:r>
           </a:p>
           <a:p>
@@ -5191,7 +6002,15 @@
             </a:r>
             <a:r>
               <a:rPr lang="en-GB" sz="1400" dirty="0" smtClean="0"/>
-              <a:t> for some of the models fitted the residual variance is fixed at “almost zero”. The value of this “almost zero” is currently 10^-4 but this is quite random. How can we improve this?</a:t>
+              <a:t> for some of the models fitted the residual variance is fixed at “almost zero”. The value of this “almost zero” is currently 10^-</a:t>
+            </a:r>
+            <a:r>
+              <a:rPr lang="en-GB" sz="1400" dirty="0" smtClean="0"/>
+              <a:t>4 in one place and 10^-3 in another </a:t>
+            </a:r>
+            <a:r>
+              <a:rPr lang="en-GB" sz="1400" dirty="0" smtClean="0"/>
+              <a:t>but this is quite random. How can we improve this?</a:t>
             </a:r>
           </a:p>
           <a:p>
@@ -5205,8 +6024,15 @@
             </a:r>
             <a:r>
               <a:rPr lang="en-GB" sz="1400" dirty="0" smtClean="0"/>
-              <a:t> and if so what is its use?</a:t>
-            </a:r>
+              <a:t> and if so what is its use</a:t>
+            </a:r>
+            <a:r>
+              <a:rPr lang="en-GB" sz="1400" dirty="0" smtClean="0"/>
+              <a:t>?</a:t>
+            </a:r>
+          </a:p>
+          <a:p>
+            <a:endParaRPr lang="en-GB" sz="1400" dirty="0" smtClean="0"/>
           </a:p>
           <a:p>
             <a:endParaRPr lang="en-GB" sz="1400" dirty="0"/>
@@ -5456,8 +6282,8 @@
         </p:nvSpPr>
         <p:spPr>
           <a:xfrm>
-            <a:off x="3644540" y="897099"/>
-            <a:ext cx="1679171" cy="623454"/>
+            <a:off x="3644540" y="897098"/>
+            <a:ext cx="1679171" cy="1752799"/>
           </a:xfrm>
           <a:prstGeom prst="rect">
             <a:avLst/>
@@ -5496,9 +6322,52 @@
             </a:r>
             <a:r>
               <a:rPr lang="en-GB" dirty="0" smtClean="0"/>
-              <a:t> (Trial Data)</a:t>
-            </a:r>
+              <a:t> (Trial Data</a:t>
+            </a:r>
+            <a:r>
+              <a:rPr lang="en-GB" dirty="0" smtClean="0"/>
+              <a:t>)</a:t>
+            </a:r>
+          </a:p>
+          <a:p>
+            <a:pPr algn="ctr"/>
             <a:endParaRPr lang="en-GB" dirty="0"/>
+          </a:p>
+          <a:p>
+            <a:pPr marL="285750" indent="-285750">
+              <a:buFont typeface="Arial" panose="020B0604020202020204" pitchFamily="34" charset="0"/>
+              <a:buChar char="•"/>
+            </a:pPr>
+            <a:r>
+              <a:rPr lang="en-GB" sz="1300" dirty="0" smtClean="0"/>
+              <a:t>list of </a:t>
+            </a:r>
+            <a:r>
+              <a:rPr lang="en-GB" sz="1300" dirty="0" err="1" smtClean="0"/>
+              <a:t>dataframes</a:t>
+            </a:r>
+            <a:endParaRPr lang="en-GB" sz="1300" dirty="0" smtClean="0"/>
+          </a:p>
+          <a:p>
+            <a:pPr marL="285750" indent="-285750">
+              <a:buFont typeface="Arial" panose="020B0604020202020204" pitchFamily="34" charset="0"/>
+              <a:buChar char="•"/>
+            </a:pPr>
+            <a:r>
+              <a:rPr lang="en-GB" sz="1300" dirty="0" smtClean="0"/>
+              <a:t>one per trial </a:t>
+            </a:r>
+          </a:p>
+          <a:p>
+            <a:pPr marL="285750" indent="-285750">
+              <a:buFont typeface="Arial" panose="020B0604020202020204" pitchFamily="34" charset="0"/>
+              <a:buChar char="•"/>
+            </a:pPr>
+            <a:r>
+              <a:rPr lang="en-GB" sz="1300" dirty="0" smtClean="0"/>
+              <a:t>metadata per trial</a:t>
+            </a:r>
+            <a:endParaRPr lang="en-GB" sz="1300" dirty="0"/>
           </a:p>
         </p:txBody>
       </p:sp>
@@ -5595,8 +6464,8 @@
         </p:nvCxnSpPr>
         <p:spPr>
           <a:xfrm>
-            <a:off x="4544609" y="1587055"/>
-            <a:ext cx="0" cy="558989"/>
+            <a:off x="4469583" y="4222875"/>
+            <a:ext cx="0" cy="457200"/>
           </a:xfrm>
           <a:prstGeom prst="straightConnector1">
             <a:avLst/>
@@ -5631,7 +6500,7 @@
         </p:nvSpPr>
         <p:spPr>
           <a:xfrm>
-            <a:off x="3858809" y="2271809"/>
+            <a:off x="3783783" y="4749002"/>
             <a:ext cx="1371600" cy="623454"/>
           </a:xfrm>
           <a:prstGeom prst="rect">
@@ -5681,8 +6550,8 @@
         </p:nvSpPr>
         <p:spPr>
           <a:xfrm>
-            <a:off x="3858809" y="3021027"/>
-            <a:ext cx="1371600" cy="1522985"/>
+            <a:off x="3783783" y="5498220"/>
+            <a:ext cx="1371600" cy="1035583"/>
           </a:xfrm>
           <a:prstGeom prst="rect">
             <a:avLst/>
@@ -5727,8 +6596,9 @@
             </a:pPr>
             <a:r>
               <a:rPr lang="en-GB" sz="1400" dirty="0" smtClean="0"/>
-              <a:t>Boxplot</a:t>
-            </a:r>
+              <a:t>Field layout</a:t>
+            </a:r>
+            <a:endParaRPr lang="en-GB" sz="1400" dirty="0" smtClean="0"/>
           </a:p>
           <a:p>
             <a:pPr marL="285750" indent="-285750">
@@ -5737,29 +6607,9 @@
             </a:pPr>
             <a:r>
               <a:rPr lang="en-GB" sz="1400" dirty="0" smtClean="0"/>
-              <a:t>Histogram</a:t>
-            </a:r>
-          </a:p>
-          <a:p>
-            <a:pPr marL="285750" indent="-285750">
-              <a:buFont typeface="Arial" panose="020B0604020202020204" pitchFamily="34" charset="0"/>
-              <a:buChar char="•"/>
-            </a:pPr>
-            <a:r>
-              <a:rPr lang="en-GB" sz="1400" dirty="0" smtClean="0"/>
-              <a:t>Scatterplot</a:t>
-            </a:r>
-          </a:p>
-          <a:p>
-            <a:pPr marL="285750" indent="-285750">
-              <a:buFont typeface="Arial" panose="020B0604020202020204" pitchFamily="34" charset="0"/>
-              <a:buChar char="•"/>
-            </a:pPr>
-            <a:r>
-              <a:rPr lang="en-GB" sz="1400" dirty="0" err="1" smtClean="0"/>
-              <a:t>Heatmap</a:t>
-            </a:r>
-            <a:endParaRPr lang="en-GB" sz="1400" dirty="0"/>
+              <a:t>Map</a:t>
+            </a:r>
+            <a:endParaRPr lang="en-GB" sz="1400" dirty="0" smtClean="0"/>
           </a:p>
         </p:txBody>
       </p:sp>
@@ -5991,8 +6841,8 @@
         </p:nvSpPr>
         <p:spPr>
           <a:xfrm>
-            <a:off x="5384534" y="2054321"/>
-            <a:ext cx="1787235" cy="4309160"/>
+            <a:off x="5384534" y="2054320"/>
+            <a:ext cx="1787235" cy="4479483"/>
           </a:xfrm>
           <a:prstGeom prst="rect">
             <a:avLst/>
@@ -6053,8 +6903,8 @@
               <a:t>Main </a:t>
             </a:r>
             <a:r>
-              <a:rPr lang="en-GB" sz="1400" dirty="0" err="1" smtClean="0"/>
-              <a:t>modeling</a:t>
+              <a:rPr lang="en-GB" sz="1400" dirty="0" smtClean="0"/>
+              <a:t>modelling</a:t>
             </a:r>
             <a:endParaRPr lang="en-GB" sz="1400" dirty="0" smtClean="0"/>
           </a:p>
@@ -6108,8 +6958,23 @@
             </a:pPr>
             <a:r>
               <a:rPr lang="en-GB" sz="1400" dirty="0" smtClean="0"/>
-              <a:t>Exact model depends on design and options</a:t>
-            </a:r>
+              <a:t>Exact model depends on design and </a:t>
+            </a:r>
+            <a:r>
+              <a:rPr lang="en-GB" sz="1400" dirty="0" smtClean="0"/>
+              <a:t>options</a:t>
+            </a:r>
+          </a:p>
+          <a:p>
+            <a:pPr marL="285750" indent="-285750">
+              <a:buFont typeface="Arial" panose="020B0604020202020204" pitchFamily="34" charset="0"/>
+              <a:buChar char="•"/>
+            </a:pPr>
+            <a:r>
+              <a:rPr lang="en-GB" sz="1400" dirty="0" smtClean="0"/>
+              <a:t>1 or more trials</a:t>
+            </a:r>
+            <a:endParaRPr lang="en-GB" sz="1400" dirty="0" smtClean="0"/>
           </a:p>
           <a:p>
             <a:pPr marL="285750" indent="-285750">
@@ -6426,7 +7291,7 @@
         <p:spPr>
           <a:xfrm>
             <a:off x="9872895" y="897098"/>
-            <a:ext cx="1787235" cy="5018509"/>
+            <a:ext cx="1787235" cy="5088066"/>
           </a:xfrm>
           <a:prstGeom prst="rect">
             <a:avLst/>
@@ -6594,7 +7459,21 @@
             </a:pPr>
             <a:r>
               <a:rPr lang="en-GB" sz="1400" dirty="0" smtClean="0"/>
-              <a:t>1 or more traits</a:t>
+              <a:t>1 or more trials</a:t>
+            </a:r>
+          </a:p>
+          <a:p>
+            <a:pPr marL="285750" indent="-285750">
+              <a:buFont typeface="Arial" panose="020B0604020202020204" pitchFamily="34" charset="0"/>
+              <a:buChar char="•"/>
+            </a:pPr>
+            <a:r>
+              <a:rPr lang="en-GB" sz="1400" dirty="0" smtClean="0"/>
+              <a:t>1 </a:t>
+            </a:r>
+            <a:r>
+              <a:rPr lang="en-GB" sz="1400" dirty="0" smtClean="0"/>
+              <a:t>or more traits</a:t>
             </a:r>
             <a:endParaRPr lang="en-GB" sz="1400" dirty="0"/>
           </a:p>
@@ -6610,6 +7489,174 @@
           <a:xfrm>
             <a:off x="9473420" y="1199495"/>
             <a:ext cx="317441" cy="0"/>
+          </a:xfrm>
+          <a:prstGeom prst="straightConnector1">
+            <a:avLst/>
+          </a:prstGeom>
+          <a:ln>
+            <a:solidFill>
+              <a:schemeClr val="tx1"/>
+            </a:solidFill>
+            <a:tailEnd type="triangle"/>
+          </a:ln>
+        </p:spPr>
+        <p:style>
+          <a:lnRef idx="1">
+            <a:schemeClr val="accent1"/>
+          </a:lnRef>
+          <a:fillRef idx="0">
+            <a:schemeClr val="accent1"/>
+          </a:fillRef>
+          <a:effectRef idx="0">
+            <a:schemeClr val="accent1"/>
+          </a:effectRef>
+          <a:fontRef idx="minor">
+            <a:schemeClr val="tx1"/>
+          </a:fontRef>
+        </p:style>
+      </p:cxnSp>
+      <p:sp>
+        <p:nvSpPr>
+          <p:cNvPr id="23" name="Rectangle 22"/>
+          <p:cNvSpPr/>
+          <p:nvPr/>
+        </p:nvSpPr>
+        <p:spPr>
+          <a:xfrm>
+            <a:off x="3783783" y="2891136"/>
+            <a:ext cx="1371600" cy="1307640"/>
+          </a:xfrm>
+          <a:prstGeom prst="rect">
+            <a:avLst/>
+          </a:prstGeom>
+        </p:spPr>
+        <p:style>
+          <a:lnRef idx="2">
+            <a:schemeClr val="dk1"/>
+          </a:lnRef>
+          <a:fillRef idx="1">
+            <a:schemeClr val="lt1"/>
+          </a:fillRef>
+          <a:effectRef idx="0">
+            <a:schemeClr val="dk1"/>
+          </a:effectRef>
+          <a:fontRef idx="minor">
+            <a:schemeClr val="dk1"/>
+          </a:fontRef>
+        </p:style>
+        <p:txBody>
+          <a:bodyPr rtlCol="0" anchor="ctr"/>
+          <a:lstStyle/>
+          <a:p>
+            <a:pPr algn="ctr"/>
+            <a:r>
+              <a:rPr lang="en-GB" dirty="0" err="1" smtClean="0">
+                <a:solidFill>
+                  <a:srgbClr val="0070C0"/>
+                </a:solidFill>
+              </a:rPr>
+              <a:t>getMeta</a:t>
+            </a:r>
+            <a:endParaRPr lang="en-GB" dirty="0" smtClean="0">
+              <a:solidFill>
+                <a:srgbClr val="0070C0"/>
+              </a:solidFill>
+            </a:endParaRPr>
+          </a:p>
+          <a:p>
+            <a:pPr algn="ctr"/>
+            <a:r>
+              <a:rPr lang="en-GB" dirty="0" err="1" smtClean="0">
+                <a:solidFill>
+                  <a:srgbClr val="0070C0"/>
+                </a:solidFill>
+              </a:rPr>
+              <a:t>setMeta</a:t>
+            </a:r>
+            <a:endParaRPr lang="en-GB" dirty="0" smtClean="0">
+              <a:solidFill>
+                <a:srgbClr val="0070C0"/>
+              </a:solidFill>
+            </a:endParaRPr>
+          </a:p>
+          <a:p>
+            <a:endParaRPr lang="en-GB" sz="1200" dirty="0" smtClean="0">
+              <a:solidFill>
+                <a:schemeClr val="tx1"/>
+              </a:solidFill>
+            </a:endParaRPr>
+          </a:p>
+          <a:p>
+            <a:r>
+              <a:rPr lang="en-GB" sz="1200" dirty="0" smtClean="0">
+                <a:solidFill>
+                  <a:schemeClr val="tx1"/>
+                </a:solidFill>
+              </a:rPr>
+              <a:t>get/set metadata as </a:t>
+            </a:r>
+            <a:r>
+              <a:rPr lang="en-GB" sz="1200" dirty="0" err="1" smtClean="0">
+                <a:solidFill>
+                  <a:schemeClr val="tx1"/>
+                </a:solidFill>
+              </a:rPr>
+              <a:t>dataframe</a:t>
+            </a:r>
+            <a:endParaRPr lang="en-GB" sz="1200" dirty="0">
+              <a:solidFill>
+                <a:schemeClr val="tx1"/>
+              </a:solidFill>
+            </a:endParaRPr>
+          </a:p>
+        </p:txBody>
+      </p:sp>
+      <p:cxnSp>
+        <p:nvCxnSpPr>
+          <p:cNvPr id="42" name="Straight Arrow Connector 41"/>
+          <p:cNvCxnSpPr/>
+          <p:nvPr/>
+        </p:nvCxnSpPr>
+        <p:spPr>
+          <a:xfrm>
+            <a:off x="4180560" y="2683820"/>
+            <a:ext cx="0" cy="182880"/>
+          </a:xfrm>
+          <a:prstGeom prst="straightConnector1">
+            <a:avLst/>
+          </a:prstGeom>
+          <a:ln>
+            <a:solidFill>
+              <a:schemeClr val="tx1"/>
+            </a:solidFill>
+            <a:tailEnd type="triangle"/>
+          </a:ln>
+        </p:spPr>
+        <p:style>
+          <a:lnRef idx="1">
+            <a:schemeClr val="accent1"/>
+          </a:lnRef>
+          <a:fillRef idx="0">
+            <a:schemeClr val="accent1"/>
+          </a:fillRef>
+          <a:effectRef idx="0">
+            <a:schemeClr val="accent1"/>
+          </a:effectRef>
+          <a:fontRef idx="minor">
+            <a:schemeClr val="tx1"/>
+          </a:fontRef>
+        </p:style>
+      </p:cxnSp>
+      <p:cxnSp>
+        <p:nvCxnSpPr>
+          <p:cNvPr id="44" name="Straight Arrow Connector 43"/>
+          <p:cNvCxnSpPr/>
+          <p:nvPr/>
+        </p:nvCxnSpPr>
+        <p:spPr>
+          <a:xfrm rot="10800000">
+            <a:off x="4771498" y="2672203"/>
+            <a:ext cx="0" cy="182880"/>
           </a:xfrm>
           <a:prstGeom prst="straightConnector1">
             <a:avLst/>
@@ -6650,6 +7697,252 @@
 </file>
 
 <file path=ppt/slides/slide4.xml><?xml version="1.0" encoding="utf-8"?>
+<p:sld xmlns:a="http://schemas.openxmlformats.org/drawingml/2006/main" xmlns:r="http://schemas.openxmlformats.org/officeDocument/2006/relationships" xmlns:p="http://schemas.openxmlformats.org/presentationml/2006/main">
+  <p:cSld>
+    <p:spTree>
+      <p:nvGrpSpPr>
+        <p:cNvPr id="1" name=""/>
+        <p:cNvGrpSpPr/>
+        <p:nvPr/>
+      </p:nvGrpSpPr>
+      <p:grpSpPr>
+        <a:xfrm>
+          <a:off x="0" y="0"/>
+          <a:ext cx="0" cy="0"/>
+          <a:chOff x="0" y="0"/>
+          <a:chExt cx="0" cy="0"/>
+        </a:xfrm>
+      </p:grpSpPr>
+      <p:sp>
+        <p:nvSpPr>
+          <p:cNvPr id="3" name="Content Placeholder 2"/>
+          <p:cNvSpPr>
+            <a:spLocks noGrp="1"/>
+          </p:cNvSpPr>
+          <p:nvPr>
+            <p:ph idx="1"/>
+          </p:nvPr>
+        </p:nvSpPr>
+        <p:spPr>
+          <a:xfrm>
+            <a:off x="782216" y="547331"/>
+            <a:ext cx="10515600" cy="4351338"/>
+          </a:xfrm>
+        </p:spPr>
+        <p:txBody>
+          <a:bodyPr>
+            <a:normAutofit/>
+          </a:bodyPr>
+          <a:lstStyle/>
+          <a:p>
+            <a:pPr marL="0" indent="0">
+              <a:buNone/>
+            </a:pPr>
+            <a:r>
+              <a:rPr lang="en-GB" sz="1800" dirty="0" smtClean="0"/>
+              <a:t>Object of class </a:t>
+            </a:r>
+            <a:r>
+              <a:rPr lang="en-GB" sz="1800" dirty="0" smtClean="0">
+                <a:solidFill>
+                  <a:srgbClr val="00B050"/>
+                </a:solidFill>
+              </a:rPr>
+              <a:t>TD</a:t>
+            </a:r>
+          </a:p>
+          <a:p>
+            <a:r>
+              <a:rPr lang="en-GB" sz="1800" dirty="0" smtClean="0"/>
+              <a:t>Renamed columns: genotype, trial, </a:t>
+            </a:r>
+            <a:r>
+              <a:rPr lang="en-GB" sz="1800" dirty="0" err="1" smtClean="0"/>
+              <a:t>megaEnv</a:t>
+            </a:r>
+            <a:r>
+              <a:rPr lang="en-GB" sz="1800" dirty="0" smtClean="0"/>
+              <a:t>, year, </a:t>
+            </a:r>
+            <a:r>
+              <a:rPr lang="en-GB" sz="1800" dirty="0" err="1" smtClean="0"/>
+              <a:t>repId</a:t>
+            </a:r>
+            <a:r>
+              <a:rPr lang="en-GB" sz="1800" dirty="0" smtClean="0"/>
+              <a:t>, </a:t>
+            </a:r>
+            <a:r>
+              <a:rPr lang="en-GB" sz="1800" dirty="0" err="1" smtClean="0"/>
+              <a:t>subBlock</a:t>
+            </a:r>
+            <a:r>
+              <a:rPr lang="en-GB" sz="1800" dirty="0" smtClean="0"/>
+              <a:t>, </a:t>
+            </a:r>
+            <a:r>
+              <a:rPr lang="en-GB" sz="1800" dirty="0" err="1" smtClean="0"/>
+              <a:t>rowId</a:t>
+            </a:r>
+            <a:r>
+              <a:rPr lang="en-GB" sz="1800" dirty="0" smtClean="0"/>
+              <a:t>, </a:t>
+            </a:r>
+            <a:r>
+              <a:rPr lang="en-GB" sz="1800" dirty="0" err="1" smtClean="0"/>
+              <a:t>colId</a:t>
+            </a:r>
+            <a:r>
+              <a:rPr lang="en-GB" sz="1800" dirty="0" smtClean="0"/>
+              <a:t>, </a:t>
+            </a:r>
+            <a:r>
+              <a:rPr lang="en-GB" sz="1800" dirty="0" err="1" smtClean="0"/>
+              <a:t>rowCoordinates</a:t>
+            </a:r>
+            <a:r>
+              <a:rPr lang="en-GB" sz="1800" dirty="0" smtClean="0"/>
+              <a:t>, </a:t>
+            </a:r>
+            <a:r>
+              <a:rPr lang="en-GB" sz="1800" dirty="0" err="1" smtClean="0"/>
+              <a:t>colCoordinates</a:t>
+            </a:r>
+            <a:r>
+              <a:rPr lang="en-GB" sz="1800" dirty="0" smtClean="0"/>
+              <a:t>, </a:t>
+            </a:r>
+            <a:r>
+              <a:rPr lang="en-GB" sz="1800" dirty="0" err="1" smtClean="0"/>
+              <a:t>checkId</a:t>
+            </a:r>
+            <a:endParaRPr lang="en-GB" sz="1800" dirty="0" smtClean="0"/>
+          </a:p>
+          <a:p>
+            <a:endParaRPr lang="en-GB" sz="1800" dirty="0"/>
+          </a:p>
+          <a:p>
+            <a:r>
+              <a:rPr lang="en-GB" sz="1800" dirty="0" smtClean="0"/>
+              <a:t>Metadata: </a:t>
+            </a:r>
+            <a:r>
+              <a:rPr lang="en-GB" sz="1800" dirty="0" err="1" smtClean="0"/>
+              <a:t>trLocation</a:t>
+            </a:r>
+            <a:r>
+              <a:rPr lang="en-GB" sz="1800" dirty="0" smtClean="0"/>
+              <a:t>, </a:t>
+            </a:r>
+            <a:r>
+              <a:rPr lang="en-GB" sz="1800" dirty="0" err="1" smtClean="0"/>
+              <a:t>trDate</a:t>
+            </a:r>
+            <a:r>
+              <a:rPr lang="en-GB" sz="1800" dirty="0" smtClean="0"/>
+              <a:t>, </a:t>
+            </a:r>
+            <a:r>
+              <a:rPr lang="en-GB" sz="1800" dirty="0" err="1" smtClean="0"/>
+              <a:t>trDesign</a:t>
+            </a:r>
+            <a:r>
+              <a:rPr lang="en-GB" sz="1800" dirty="0" smtClean="0"/>
+              <a:t>, </a:t>
+            </a:r>
+            <a:r>
+              <a:rPr lang="en-GB" sz="1800" dirty="0" err="1" smtClean="0"/>
+              <a:t>trLat</a:t>
+            </a:r>
+            <a:r>
+              <a:rPr lang="en-GB" sz="1800" dirty="0" smtClean="0"/>
+              <a:t>, </a:t>
+            </a:r>
+            <a:r>
+              <a:rPr lang="en-GB" sz="1800" dirty="0" err="1" smtClean="0"/>
+              <a:t>trLong</a:t>
+            </a:r>
+            <a:r>
+              <a:rPr lang="en-GB" sz="1800" dirty="0" smtClean="0"/>
+              <a:t>, </a:t>
+            </a:r>
+            <a:r>
+              <a:rPr lang="en-GB" sz="1800" dirty="0" err="1" smtClean="0"/>
+              <a:t>trPlotWidth</a:t>
+            </a:r>
+            <a:r>
+              <a:rPr lang="en-GB" sz="1800" dirty="0" smtClean="0"/>
+              <a:t>, </a:t>
+            </a:r>
+            <a:r>
+              <a:rPr lang="en-GB" sz="1800" dirty="0" err="1" smtClean="0"/>
+              <a:t>trPlotLength</a:t>
+            </a:r>
+            <a:endParaRPr lang="en-GB" sz="1800" dirty="0" smtClean="0"/>
+          </a:p>
+          <a:p>
+            <a:endParaRPr lang="en-GB" sz="1800" dirty="0"/>
+          </a:p>
+          <a:p>
+            <a:pPr marL="0" indent="0">
+              <a:buNone/>
+            </a:pPr>
+            <a:r>
+              <a:rPr lang="en-GB" sz="1800" dirty="0" smtClean="0"/>
+              <a:t>When creating an object of class TD for each value in the trial column an item is created in the output list.</a:t>
+            </a:r>
+          </a:p>
+          <a:p>
+            <a:pPr marL="0" indent="0">
+              <a:buNone/>
+            </a:pPr>
+            <a:r>
+              <a:rPr lang="en-GB" sz="1800" dirty="0" smtClean="0"/>
+              <a:t>Metadata can be added when creating the object or using  </a:t>
+            </a:r>
+            <a:r>
+              <a:rPr lang="en-GB" sz="1800" dirty="0" err="1" smtClean="0"/>
+              <a:t>setMeta</a:t>
+            </a:r>
+            <a:r>
+              <a:rPr lang="en-GB" sz="1800" dirty="0" smtClean="0"/>
+              <a:t>.</a:t>
+            </a:r>
+          </a:p>
+          <a:p>
+            <a:pPr marL="0" indent="0">
+              <a:buNone/>
+            </a:pPr>
+            <a:endParaRPr lang="en-GB" sz="1800" dirty="0"/>
+          </a:p>
+          <a:p>
+            <a:pPr marL="0" indent="0">
+              <a:buNone/>
+            </a:pPr>
+            <a:endParaRPr lang="en-GB" sz="1800" dirty="0" smtClean="0"/>
+          </a:p>
+          <a:p>
+            <a:pPr marL="457200" lvl="1" indent="0">
+              <a:buNone/>
+            </a:pPr>
+            <a:endParaRPr lang="en-GB" sz="1400" dirty="0" smtClean="0"/>
+          </a:p>
+        </p:txBody>
+      </p:sp>
+    </p:spTree>
+    <p:extLst>
+      <p:ext uri="{BB962C8B-B14F-4D97-AF65-F5344CB8AC3E}">
+        <p14:creationId xmlns:p14="http://schemas.microsoft.com/office/powerpoint/2010/main" val="717606817"/>
+      </p:ext>
+    </p:extLst>
+  </p:cSld>
+  <p:clrMapOvr>
+    <a:masterClrMapping/>
+  </p:clrMapOvr>
+</p:sld>
+</file>
+
+<file path=ppt/slides/slide5.xml><?xml version="1.0" encoding="utf-8"?>
 <p:sld xmlns:a="http://schemas.openxmlformats.org/drawingml/2006/main" xmlns:r="http://schemas.openxmlformats.org/officeDocument/2006/relationships" xmlns:p="http://schemas.openxmlformats.org/presentationml/2006/main">
   <p:cSld>
     <p:spTree>
@@ -7234,7 +8527,7 @@
 </p:sld>
 </file>
 
-<file path=ppt/slides/slide5.xml><?xml version="1.0" encoding="utf-8"?>
+<file path=ppt/slides/slide6.xml><?xml version="1.0" encoding="utf-8"?>
 <p:sld xmlns:a="http://schemas.openxmlformats.org/drawingml/2006/main" xmlns:r="http://schemas.openxmlformats.org/officeDocument/2006/relationships" xmlns:p="http://schemas.openxmlformats.org/presentationml/2006/main">
   <p:cSld>
     <p:spTree>
@@ -7826,7 +9119,7 @@
 </p:sld>
 </file>
 
-<file path=ppt/slides/slide6.xml><?xml version="1.0" encoding="utf-8"?>
+<file path=ppt/slides/slide7.xml><?xml version="1.0" encoding="utf-8"?>
 <p:sld xmlns:a="http://schemas.openxmlformats.org/drawingml/2006/main" xmlns:r="http://schemas.openxmlformats.org/officeDocument/2006/relationships" xmlns:p="http://schemas.openxmlformats.org/presentationml/2006/main">
   <p:cSld>
     <p:spTree>
@@ -8395,7 +9688,7 @@
 </p:sld>
 </file>
 
-<file path=ppt/slides/slide7.xml><?xml version="1.0" encoding="utf-8"?>
+<file path=ppt/slides/slide8.xml><?xml version="1.0" encoding="utf-8"?>
 <p:sld xmlns:a="http://schemas.openxmlformats.org/drawingml/2006/main" xmlns:r="http://schemas.openxmlformats.org/officeDocument/2006/relationships" xmlns:p="http://schemas.openxmlformats.org/presentationml/2006/main">
   <p:cSld>
     <p:spTree>
@@ -8985,7 +10278,7 @@
 </p:sld>
 </file>
 
-<file path=ppt/slides/slide8.xml><?xml version="1.0" encoding="utf-8"?>
+<file path=ppt/slides/slide9.xml><?xml version="1.0" encoding="utf-8"?>
 <p:sld xmlns:a="http://schemas.openxmlformats.org/drawingml/2006/main" xmlns:r="http://schemas.openxmlformats.org/officeDocument/2006/relationships" xmlns:p="http://schemas.openxmlformats.org/presentationml/2006/main">
   <p:cSld>
     <p:spTree>
@@ -9212,7 +10505,7 @@
             </a:r>
             <a:r>
               <a:rPr lang="en-GB" sz="1400" dirty="0" err="1" smtClean="0"/>
-              <a:t>modleing</a:t>
+              <a:t>modeling</a:t>
             </a:r>
             <a:endParaRPr lang="en-GB" sz="1400" dirty="0" smtClean="0"/>
           </a:p>
@@ -9505,765 +10798,6 @@
     <p:extLst>
       <p:ext uri="{BB962C8B-B14F-4D97-AF65-F5344CB8AC3E}">
         <p14:creationId xmlns:p14="http://schemas.microsoft.com/office/powerpoint/2010/main" val="1106584791"/>
-      </p:ext>
-    </p:extLst>
-  </p:cSld>
-  <p:clrMapOvr>
-    <a:masterClrMapping/>
-  </p:clrMapOvr>
-</p:sld>
-</file>
-
-<file path=ppt/slides/slide9.xml><?xml version="1.0" encoding="utf-8"?>
-<p:sld xmlns:a="http://schemas.openxmlformats.org/drawingml/2006/main" xmlns:r="http://schemas.openxmlformats.org/officeDocument/2006/relationships" xmlns:p="http://schemas.openxmlformats.org/presentationml/2006/main">
-  <p:cSld>
-    <p:spTree>
-      <p:nvGrpSpPr>
-        <p:cNvPr id="1" name=""/>
-        <p:cNvGrpSpPr/>
-        <p:nvPr/>
-      </p:nvGrpSpPr>
-      <p:grpSpPr>
-        <a:xfrm>
-          <a:off x="0" y="0"/>
-          <a:ext cx="0" cy="0"/>
-          <a:chOff x="0" y="0"/>
-          <a:chExt cx="0" cy="0"/>
-        </a:xfrm>
-      </p:grpSpPr>
-      <p:sp>
-        <p:nvSpPr>
-          <p:cNvPr id="4" name="Rectangle 3"/>
-          <p:cNvSpPr/>
-          <p:nvPr/>
-        </p:nvSpPr>
-        <p:spPr>
-          <a:xfrm>
-            <a:off x="505215" y="897099"/>
-            <a:ext cx="2154018" cy="623454"/>
-          </a:xfrm>
-          <a:prstGeom prst="rect">
-            <a:avLst/>
-          </a:prstGeom>
-        </p:spPr>
-        <p:style>
-          <a:lnRef idx="2">
-            <a:schemeClr val="dk1"/>
-          </a:lnRef>
-          <a:fillRef idx="1">
-            <a:schemeClr val="lt1"/>
-          </a:fillRef>
-          <a:effectRef idx="0">
-            <a:schemeClr val="dk1"/>
-          </a:effectRef>
-          <a:fontRef idx="minor">
-            <a:schemeClr val="dk1"/>
-          </a:fontRef>
-        </p:style>
-        <p:txBody>
-          <a:bodyPr rtlCol="0" anchor="ctr"/>
-          <a:lstStyle/>
-          <a:p>
-            <a:pPr algn="ctr"/>
-            <a:r>
-              <a:rPr lang="en-GB" dirty="0" smtClean="0"/>
-              <a:t>Object of class </a:t>
-            </a:r>
-            <a:r>
-              <a:rPr lang="en-GB" dirty="0" smtClean="0">
-                <a:solidFill>
-                  <a:srgbClr val="00B050"/>
-                </a:solidFill>
-              </a:rPr>
-              <a:t>SSA</a:t>
-            </a:r>
-            <a:r>
-              <a:rPr lang="en-GB" dirty="0" smtClean="0"/>
-              <a:t> (Single Site Analysis)</a:t>
-            </a:r>
-            <a:endParaRPr lang="en-GB" dirty="0"/>
-          </a:p>
-        </p:txBody>
-      </p:sp>
-      <p:sp>
-        <p:nvSpPr>
-          <p:cNvPr id="7" name="Rectangle 6"/>
-          <p:cNvSpPr/>
-          <p:nvPr/>
-        </p:nvSpPr>
-        <p:spPr>
-          <a:xfrm>
-            <a:off x="4577610" y="897099"/>
-            <a:ext cx="1981815" cy="623454"/>
-          </a:xfrm>
-          <a:prstGeom prst="rect">
-            <a:avLst/>
-          </a:prstGeom>
-        </p:spPr>
-        <p:style>
-          <a:lnRef idx="2">
-            <a:schemeClr val="dk1"/>
-          </a:lnRef>
-          <a:fillRef idx="1">
-            <a:schemeClr val="lt1"/>
-          </a:fillRef>
-          <a:effectRef idx="0">
-            <a:schemeClr val="dk1"/>
-          </a:effectRef>
-          <a:fontRef idx="minor">
-            <a:schemeClr val="dk1"/>
-          </a:fontRef>
-        </p:style>
-        <p:txBody>
-          <a:bodyPr rtlCol="0" anchor="ctr"/>
-          <a:lstStyle/>
-          <a:p>
-            <a:pPr algn="ctr"/>
-            <a:r>
-              <a:rPr lang="en-GB" dirty="0" smtClean="0"/>
-              <a:t>Object of class </a:t>
-            </a:r>
-            <a:r>
-              <a:rPr lang="en-GB" dirty="0">
-                <a:solidFill>
-                  <a:srgbClr val="00B050"/>
-                </a:solidFill>
-              </a:rPr>
-              <a:t>c</a:t>
-            </a:r>
-            <a:r>
-              <a:rPr lang="en-GB" dirty="0" smtClean="0">
-                <a:solidFill>
-                  <a:srgbClr val="00B050"/>
-                </a:solidFill>
-              </a:rPr>
-              <a:t>ross</a:t>
-            </a:r>
-            <a:r>
-              <a:rPr lang="en-GB" dirty="0" smtClean="0"/>
-              <a:t> (</a:t>
-            </a:r>
-            <a:r>
-              <a:rPr lang="en-GB" dirty="0" err="1" smtClean="0"/>
-              <a:t>qtl</a:t>
-            </a:r>
-            <a:r>
-              <a:rPr lang="en-GB" dirty="0" smtClean="0"/>
-              <a:t> package)</a:t>
-            </a:r>
-            <a:endParaRPr lang="en-GB" dirty="0"/>
-          </a:p>
-        </p:txBody>
-      </p:sp>
-      <p:sp>
-        <p:nvSpPr>
-          <p:cNvPr id="11" name="Rectangle 10"/>
-          <p:cNvSpPr/>
-          <p:nvPr/>
-        </p:nvSpPr>
-        <p:spPr>
-          <a:xfrm>
-            <a:off x="2691132" y="2054322"/>
-            <a:ext cx="1787235" cy="2881572"/>
-          </a:xfrm>
-          <a:prstGeom prst="rect">
-            <a:avLst/>
-          </a:prstGeom>
-        </p:spPr>
-        <p:style>
-          <a:lnRef idx="2">
-            <a:schemeClr val="dk1"/>
-          </a:lnRef>
-          <a:fillRef idx="1">
-            <a:schemeClr val="lt1"/>
-          </a:fillRef>
-          <a:effectRef idx="0">
-            <a:schemeClr val="dk1"/>
-          </a:effectRef>
-          <a:fontRef idx="minor">
-            <a:schemeClr val="dk1"/>
-          </a:fontRef>
-        </p:style>
-        <p:txBody>
-          <a:bodyPr rtlCol="0" anchor="ctr"/>
-          <a:lstStyle/>
-          <a:p>
-            <a:pPr algn="ctr"/>
-            <a:r>
-              <a:rPr lang="en-GB" dirty="0" err="1" smtClean="0">
-                <a:solidFill>
-                  <a:srgbClr val="0070C0"/>
-                </a:solidFill>
-              </a:rPr>
-              <a:t>SSAtoCross</a:t>
-            </a:r>
-            <a:endParaRPr lang="en-GB" dirty="0" smtClean="0">
-              <a:solidFill>
-                <a:srgbClr val="0070C0"/>
-              </a:solidFill>
-            </a:endParaRPr>
-          </a:p>
-          <a:p>
-            <a:pPr algn="ctr"/>
-            <a:endParaRPr lang="en-GB" dirty="0" smtClean="0"/>
-          </a:p>
-          <a:p>
-            <a:r>
-              <a:rPr lang="en-GB" sz="1400" dirty="0" smtClean="0"/>
-              <a:t>Create cross object based on SSA object</a:t>
-            </a:r>
-          </a:p>
-          <a:p>
-            <a:endParaRPr lang="en-GB" sz="1400" dirty="0"/>
-          </a:p>
-          <a:p>
-            <a:pPr marL="285750" indent="-285750">
-              <a:buFont typeface="Arial" panose="020B0604020202020204" pitchFamily="34" charset="0"/>
-              <a:buChar char="•"/>
-            </a:pPr>
-            <a:r>
-              <a:rPr lang="en-GB" sz="1400" dirty="0" smtClean="0"/>
-              <a:t>BLUEs or BLUPs as trait</a:t>
-            </a:r>
-          </a:p>
-          <a:p>
-            <a:pPr marL="285750" indent="-285750">
-              <a:buFont typeface="Arial" panose="020B0604020202020204" pitchFamily="34" charset="0"/>
-              <a:buChar char="•"/>
-            </a:pPr>
-            <a:r>
-              <a:rPr lang="en-GB" sz="1400" dirty="0" smtClean="0"/>
-              <a:t>1 or more traits</a:t>
-            </a:r>
-          </a:p>
-          <a:p>
-            <a:pPr marL="285750" indent="-285750">
-              <a:buFont typeface="Arial" panose="020B0604020202020204" pitchFamily="34" charset="0"/>
-              <a:buChar char="•"/>
-            </a:pPr>
-            <a:r>
-              <a:rPr lang="en-GB" sz="1400" dirty="0" smtClean="0"/>
-              <a:t>Genotypic data imported from external file</a:t>
-            </a:r>
-          </a:p>
-        </p:txBody>
-      </p:sp>
-      <p:cxnSp>
-        <p:nvCxnSpPr>
-          <p:cNvPr id="19" name="Straight Arrow Connector 18"/>
-          <p:cNvCxnSpPr/>
-          <p:nvPr/>
-        </p:nvCxnSpPr>
-        <p:spPr>
-          <a:xfrm>
-            <a:off x="5654963" y="1587055"/>
-            <a:ext cx="0" cy="558989"/>
-          </a:xfrm>
-          <a:prstGeom prst="straightConnector1">
-            <a:avLst/>
-          </a:prstGeom>
-          <a:ln>
-            <a:solidFill>
-              <a:schemeClr val="tx1"/>
-            </a:solidFill>
-            <a:tailEnd type="triangle"/>
-          </a:ln>
-        </p:spPr>
-        <p:style>
-          <a:lnRef idx="1">
-            <a:schemeClr val="accent1"/>
-          </a:lnRef>
-          <a:fillRef idx="0">
-            <a:schemeClr val="accent1"/>
-          </a:fillRef>
-          <a:effectRef idx="0">
-            <a:schemeClr val="accent1"/>
-          </a:effectRef>
-          <a:fontRef idx="minor">
-            <a:schemeClr val="tx1"/>
-          </a:fontRef>
-        </p:style>
-      </p:cxnSp>
-      <p:grpSp>
-        <p:nvGrpSpPr>
-          <p:cNvPr id="31" name="Group 30"/>
-          <p:cNvGrpSpPr/>
-          <p:nvPr/>
-        </p:nvGrpSpPr>
-        <p:grpSpPr>
-          <a:xfrm>
-            <a:off x="2756449" y="1199495"/>
-            <a:ext cx="1787235" cy="759568"/>
-            <a:chOff x="1608775" y="1367443"/>
-            <a:chExt cx="1787235" cy="759568"/>
-          </a:xfrm>
-        </p:grpSpPr>
-        <p:cxnSp>
-          <p:nvCxnSpPr>
-            <p:cNvPr id="6" name="Straight Arrow Connector 5"/>
-            <p:cNvCxnSpPr/>
-            <p:nvPr/>
-          </p:nvCxnSpPr>
-          <p:spPr>
-            <a:xfrm>
-              <a:off x="1608775" y="1367443"/>
-              <a:ext cx="1787235" cy="0"/>
-            </a:xfrm>
-            <a:prstGeom prst="straightConnector1">
-              <a:avLst/>
-            </a:prstGeom>
-            <a:ln>
-              <a:tailEnd type="triangle"/>
-            </a:ln>
-          </p:spPr>
-          <p:style>
-            <a:lnRef idx="1">
-              <a:schemeClr val="dk1"/>
-            </a:lnRef>
-            <a:fillRef idx="0">
-              <a:schemeClr val="dk1"/>
-            </a:fillRef>
-            <a:effectRef idx="0">
-              <a:schemeClr val="dk1"/>
-            </a:effectRef>
-            <a:fontRef idx="minor">
-              <a:schemeClr val="tx1"/>
-            </a:fontRef>
-          </p:style>
-        </p:cxnSp>
-        <p:cxnSp>
-          <p:nvCxnSpPr>
-            <p:cNvPr id="30" name="Straight Connector 29"/>
-            <p:cNvCxnSpPr/>
-            <p:nvPr/>
-          </p:nvCxnSpPr>
-          <p:spPr>
-            <a:xfrm>
-              <a:off x="2463282" y="1367443"/>
-              <a:ext cx="9330" cy="759568"/>
-            </a:xfrm>
-            <a:prstGeom prst="line">
-              <a:avLst/>
-            </a:prstGeom>
-            <a:ln>
-              <a:solidFill>
-                <a:schemeClr val="tx1"/>
-              </a:solidFill>
-            </a:ln>
-          </p:spPr>
-          <p:style>
-            <a:lnRef idx="1">
-              <a:schemeClr val="accent1"/>
-            </a:lnRef>
-            <a:fillRef idx="0">
-              <a:schemeClr val="accent1"/>
-            </a:fillRef>
-            <a:effectRef idx="0">
-              <a:schemeClr val="accent1"/>
-            </a:effectRef>
-            <a:fontRef idx="minor">
-              <a:schemeClr val="tx1"/>
-            </a:fontRef>
-          </p:style>
-        </p:cxnSp>
-      </p:grpSp>
-      <p:sp>
-        <p:nvSpPr>
-          <p:cNvPr id="40" name="TextBox 39"/>
-          <p:cNvSpPr txBox="1"/>
-          <p:nvPr/>
-        </p:nvSpPr>
-        <p:spPr>
-          <a:xfrm>
-            <a:off x="1190584" y="119813"/>
-            <a:ext cx="9007775" cy="584775"/>
-          </a:xfrm>
-          <a:prstGeom prst="rect">
-            <a:avLst/>
-          </a:prstGeom>
-          <a:noFill/>
-        </p:spPr>
-        <p:txBody>
-          <a:bodyPr wrap="square" rtlCol="0">
-            <a:spAutoFit/>
-          </a:bodyPr>
-          <a:lstStyle/>
-          <a:p>
-            <a:pPr algn="ctr"/>
-            <a:r>
-              <a:rPr lang="en-GB" sz="3200" dirty="0" smtClean="0"/>
-              <a:t>QTL Mapping (1)</a:t>
-            </a:r>
-            <a:endParaRPr lang="en-GB" sz="3200" dirty="0"/>
-          </a:p>
-        </p:txBody>
-      </p:sp>
-      <p:sp>
-        <p:nvSpPr>
-          <p:cNvPr id="41" name="Rectangle 40"/>
-          <p:cNvSpPr/>
-          <p:nvPr/>
-        </p:nvSpPr>
-        <p:spPr>
-          <a:xfrm>
-            <a:off x="7127254" y="897100"/>
-            <a:ext cx="1787235" cy="4113440"/>
-          </a:xfrm>
-          <a:prstGeom prst="rect">
-            <a:avLst/>
-          </a:prstGeom>
-        </p:spPr>
-        <p:style>
-          <a:lnRef idx="2">
-            <a:schemeClr val="dk1"/>
-          </a:lnRef>
-          <a:fillRef idx="1">
-            <a:schemeClr val="lt1"/>
-          </a:fillRef>
-          <a:effectRef idx="0">
-            <a:schemeClr val="dk1"/>
-          </a:effectRef>
-          <a:fontRef idx="minor">
-            <a:schemeClr val="dk1"/>
-          </a:fontRef>
-        </p:style>
-        <p:txBody>
-          <a:bodyPr rtlCol="0" anchor="ctr"/>
-          <a:lstStyle/>
-          <a:p>
-            <a:pPr algn="ctr"/>
-            <a:r>
-              <a:rPr lang="en-GB" dirty="0" err="1" smtClean="0">
-                <a:solidFill>
-                  <a:srgbClr val="0070C0"/>
-                </a:solidFill>
-              </a:rPr>
-              <a:t>QTLMapQC</a:t>
-            </a:r>
-            <a:endParaRPr lang="en-GB" dirty="0" smtClean="0">
-              <a:solidFill>
-                <a:srgbClr val="0070C0"/>
-              </a:solidFill>
-            </a:endParaRPr>
-          </a:p>
-          <a:p>
-            <a:pPr algn="ctr"/>
-            <a:endParaRPr lang="en-GB" dirty="0" smtClean="0"/>
-          </a:p>
-          <a:p>
-            <a:r>
-              <a:rPr lang="en-GB" sz="1400" dirty="0" smtClean="0"/>
-              <a:t>Quality control of an object of class cross</a:t>
-            </a:r>
-          </a:p>
-          <a:p>
-            <a:endParaRPr lang="en-GB" sz="1400" dirty="0" smtClean="0"/>
-          </a:p>
-          <a:p>
-            <a:r>
-              <a:rPr lang="en-GB" sz="1400" dirty="0" smtClean="0"/>
-              <a:t>Checks/cleaning for</a:t>
-            </a:r>
-          </a:p>
-          <a:p>
-            <a:pPr marL="285750" indent="-285750">
-              <a:buFont typeface="Arial" panose="020B0604020202020204" pitchFamily="34" charset="0"/>
-              <a:buChar char="•"/>
-            </a:pPr>
-            <a:r>
-              <a:rPr lang="en-GB" sz="1400" dirty="0" smtClean="0"/>
-              <a:t>% miss markers</a:t>
-            </a:r>
-          </a:p>
-          <a:p>
-            <a:pPr marL="285750" indent="-285750">
-              <a:buFont typeface="Arial" panose="020B0604020202020204" pitchFamily="34" charset="0"/>
-              <a:buChar char="•"/>
-            </a:pPr>
-            <a:r>
-              <a:rPr lang="en-GB" sz="1400" dirty="0" smtClean="0"/>
-              <a:t>duplicates</a:t>
-            </a:r>
-          </a:p>
-          <a:p>
-            <a:pPr marL="285750" indent="-285750">
-              <a:buFont typeface="Arial" panose="020B0604020202020204" pitchFamily="34" charset="0"/>
-              <a:buChar char="•"/>
-            </a:pPr>
-            <a:r>
-              <a:rPr lang="en-GB" sz="1400" dirty="0" smtClean="0"/>
-              <a:t>%miss individuals</a:t>
-            </a:r>
-          </a:p>
-          <a:p>
-            <a:pPr marL="285750" indent="-285750">
-              <a:buFont typeface="Arial" panose="020B0604020202020204" pitchFamily="34" charset="0"/>
-              <a:buChar char="•"/>
-            </a:pPr>
-            <a:r>
-              <a:rPr lang="en-GB" sz="1400" dirty="0" smtClean="0"/>
-              <a:t>Segregation distortion</a:t>
-            </a:r>
-          </a:p>
-          <a:p>
-            <a:pPr marL="285750" indent="-285750">
-              <a:buFont typeface="Arial" panose="020B0604020202020204" pitchFamily="34" charset="0"/>
-              <a:buChar char="•"/>
-            </a:pPr>
-            <a:r>
-              <a:rPr lang="en-GB" sz="1400" dirty="0" smtClean="0"/>
-              <a:t>Recombination</a:t>
-            </a:r>
-          </a:p>
-          <a:p>
-            <a:pPr marL="285750" indent="-285750">
-              <a:buFont typeface="Arial" panose="020B0604020202020204" pitchFamily="34" charset="0"/>
-              <a:buChar char="•"/>
-            </a:pPr>
-            <a:r>
-              <a:rPr lang="en-GB" sz="1400" dirty="0" err="1" smtClean="0"/>
-              <a:t>Reestimate</a:t>
-            </a:r>
-            <a:r>
-              <a:rPr lang="en-GB" sz="1400" dirty="0" smtClean="0"/>
-              <a:t> map</a:t>
-            </a:r>
-          </a:p>
-          <a:p>
-            <a:pPr marL="285750" indent="-285750">
-              <a:buFont typeface="Arial" panose="020B0604020202020204" pitchFamily="34" charset="0"/>
-              <a:buChar char="•"/>
-            </a:pPr>
-            <a:r>
-              <a:rPr lang="en-GB" sz="1400" dirty="0" smtClean="0"/>
-              <a:t>% crossover</a:t>
-            </a:r>
-          </a:p>
-          <a:p>
-            <a:pPr marL="285750" indent="-285750">
-              <a:buFont typeface="Arial" panose="020B0604020202020204" pitchFamily="34" charset="0"/>
-              <a:buChar char="•"/>
-            </a:pPr>
-            <a:endParaRPr lang="en-GB" sz="1400" dirty="0"/>
-          </a:p>
-          <a:p>
-            <a:r>
-              <a:rPr lang="en-GB" sz="1400" dirty="0" smtClean="0"/>
-              <a:t>All checks are optional</a:t>
-            </a:r>
-          </a:p>
-        </p:txBody>
-      </p:sp>
-      <p:cxnSp>
-        <p:nvCxnSpPr>
-          <p:cNvPr id="43" name="Straight Arrow Connector 42"/>
-          <p:cNvCxnSpPr/>
-          <p:nvPr/>
-        </p:nvCxnSpPr>
-        <p:spPr>
-          <a:xfrm>
-            <a:off x="6624743" y="1199495"/>
-            <a:ext cx="420477" cy="1"/>
-          </a:xfrm>
-          <a:prstGeom prst="straightConnector1">
-            <a:avLst/>
-          </a:prstGeom>
-          <a:ln>
-            <a:solidFill>
-              <a:schemeClr val="tx1"/>
-            </a:solidFill>
-            <a:tailEnd type="triangle"/>
-          </a:ln>
-        </p:spPr>
-        <p:style>
-          <a:lnRef idx="1">
-            <a:schemeClr val="accent1"/>
-          </a:lnRef>
-          <a:fillRef idx="0">
-            <a:schemeClr val="accent1"/>
-          </a:fillRef>
-          <a:effectRef idx="0">
-            <a:schemeClr val="accent1"/>
-          </a:effectRef>
-          <a:fontRef idx="minor">
-            <a:schemeClr val="tx1"/>
-          </a:fontRef>
-        </p:style>
-      </p:cxnSp>
-      <p:sp>
-        <p:nvSpPr>
-          <p:cNvPr id="23" name="Rectangle 22"/>
-          <p:cNvSpPr/>
-          <p:nvPr/>
-        </p:nvSpPr>
-        <p:spPr>
-          <a:xfrm>
-            <a:off x="4969163" y="2271809"/>
-            <a:ext cx="1371600" cy="1009006"/>
-          </a:xfrm>
-          <a:prstGeom prst="rect">
-            <a:avLst/>
-          </a:prstGeom>
-        </p:spPr>
-        <p:style>
-          <a:lnRef idx="2">
-            <a:schemeClr val="dk1"/>
-          </a:lnRef>
-          <a:fillRef idx="1">
-            <a:schemeClr val="lt1"/>
-          </a:fillRef>
-          <a:effectRef idx="0">
-            <a:schemeClr val="dk1"/>
-          </a:effectRef>
-          <a:fontRef idx="minor">
-            <a:schemeClr val="dk1"/>
-          </a:fontRef>
-        </p:style>
-        <p:txBody>
-          <a:bodyPr rtlCol="0" anchor="ctr"/>
-          <a:lstStyle/>
-          <a:p>
-            <a:pPr algn="ctr"/>
-            <a:r>
-              <a:rPr lang="en-GB" dirty="0" smtClean="0">
-                <a:solidFill>
-                  <a:srgbClr val="0070C0"/>
-                </a:solidFill>
-              </a:rPr>
-              <a:t>Report</a:t>
-            </a:r>
-          </a:p>
-          <a:p>
-            <a:pPr algn="ctr"/>
-            <a:endParaRPr lang="en-GB" dirty="0" smtClean="0"/>
-          </a:p>
-          <a:p>
-            <a:pPr marL="285750" indent="-285750">
-              <a:buFont typeface="Arial" panose="020B0604020202020204" pitchFamily="34" charset="0"/>
-              <a:buChar char="•"/>
-            </a:pPr>
-            <a:r>
-              <a:rPr lang="en-GB" sz="1400" dirty="0" smtClean="0"/>
-              <a:t>.pdf + .</a:t>
-            </a:r>
-            <a:r>
-              <a:rPr lang="en-GB" sz="1400" dirty="0" err="1" smtClean="0"/>
-              <a:t>tex</a:t>
-            </a:r>
-            <a:endParaRPr lang="en-GB" sz="1400" dirty="0"/>
-          </a:p>
-        </p:txBody>
-      </p:sp>
-      <p:sp>
-        <p:nvSpPr>
-          <p:cNvPr id="26" name="Rectangle 25"/>
-          <p:cNvSpPr/>
-          <p:nvPr/>
-        </p:nvSpPr>
-        <p:spPr>
-          <a:xfrm>
-            <a:off x="9581561" y="887768"/>
-            <a:ext cx="1981815" cy="623454"/>
-          </a:xfrm>
-          <a:prstGeom prst="rect">
-            <a:avLst/>
-          </a:prstGeom>
-        </p:spPr>
-        <p:style>
-          <a:lnRef idx="2">
-            <a:schemeClr val="dk1"/>
-          </a:lnRef>
-          <a:fillRef idx="1">
-            <a:schemeClr val="lt1"/>
-          </a:fillRef>
-          <a:effectRef idx="0">
-            <a:schemeClr val="dk1"/>
-          </a:effectRef>
-          <a:fontRef idx="minor">
-            <a:schemeClr val="dk1"/>
-          </a:fontRef>
-        </p:style>
-        <p:txBody>
-          <a:bodyPr rtlCol="0" anchor="ctr"/>
-          <a:lstStyle/>
-          <a:p>
-            <a:pPr algn="ctr"/>
-            <a:r>
-              <a:rPr lang="en-GB" dirty="0" smtClean="0"/>
-              <a:t>Object of class </a:t>
-            </a:r>
-            <a:r>
-              <a:rPr lang="en-GB" dirty="0">
-                <a:solidFill>
-                  <a:srgbClr val="00B050"/>
-                </a:solidFill>
-              </a:rPr>
-              <a:t>c</a:t>
-            </a:r>
-            <a:r>
-              <a:rPr lang="en-GB" dirty="0" smtClean="0">
-                <a:solidFill>
-                  <a:srgbClr val="00B050"/>
-                </a:solidFill>
-              </a:rPr>
-              <a:t>ross</a:t>
-            </a:r>
-            <a:r>
-              <a:rPr lang="en-GB" dirty="0" smtClean="0"/>
-              <a:t> (</a:t>
-            </a:r>
-            <a:r>
-              <a:rPr lang="en-GB" dirty="0" err="1" smtClean="0"/>
-              <a:t>qtl</a:t>
-            </a:r>
-            <a:r>
-              <a:rPr lang="en-GB" dirty="0" smtClean="0"/>
-              <a:t> package)</a:t>
-            </a:r>
-            <a:endParaRPr lang="en-GB" dirty="0"/>
-          </a:p>
-        </p:txBody>
-      </p:sp>
-      <p:cxnSp>
-        <p:nvCxnSpPr>
-          <p:cNvPr id="27" name="Straight Arrow Connector 26"/>
-          <p:cNvCxnSpPr/>
-          <p:nvPr/>
-        </p:nvCxnSpPr>
-        <p:spPr>
-          <a:xfrm>
-            <a:off x="8996523" y="1199494"/>
-            <a:ext cx="485795" cy="1"/>
-          </a:xfrm>
-          <a:prstGeom prst="straightConnector1">
-            <a:avLst/>
-          </a:prstGeom>
-          <a:ln>
-            <a:solidFill>
-              <a:schemeClr val="tx1"/>
-            </a:solidFill>
-            <a:tailEnd type="triangle"/>
-          </a:ln>
-        </p:spPr>
-        <p:style>
-          <a:lnRef idx="1">
-            <a:schemeClr val="accent1"/>
-          </a:lnRef>
-          <a:fillRef idx="0">
-            <a:schemeClr val="accent1"/>
-          </a:fillRef>
-          <a:effectRef idx="0">
-            <a:schemeClr val="accent1"/>
-          </a:effectRef>
-          <a:fontRef idx="minor">
-            <a:schemeClr val="tx1"/>
-          </a:fontRef>
-        </p:style>
-      </p:cxnSp>
-    </p:spTree>
-    <p:extLst>
-      <p:ext uri="{BB962C8B-B14F-4D97-AF65-F5344CB8AC3E}">
-        <p14:creationId xmlns:p14="http://schemas.microsoft.com/office/powerpoint/2010/main" val="3963092974"/>
       </p:ext>
     </p:extLst>
   </p:cSld>

</xml_diff>